<commit_message>
Lab 1 and Lab 2 added
</commit_message>
<xml_diff>
--- a/Poster/Regression Lab Poster [Autosaved].pptx
+++ b/Poster/Regression Lab Poster [Autosaved].pptx
@@ -243,7 +243,7 @@
           <a:p>
             <a:fld id="{49A02A90-E5B2-4178-83FD-9ED89742CA66}" type="datetimeFigureOut">
               <a:rPr lang="en-US" smtClean="0"/>
-              <a:t>12/19/2024</a:t>
+              <a:t>12/23/2024</a:t>
             </a:fld>
             <a:endParaRPr lang="en-US"/>
           </a:p>
@@ -413,7 +413,7 @@
           <a:p>
             <a:fld id="{49A02A90-E5B2-4178-83FD-9ED89742CA66}" type="datetimeFigureOut">
               <a:rPr lang="en-US" smtClean="0"/>
-              <a:t>12/19/2024</a:t>
+              <a:t>12/23/2024</a:t>
             </a:fld>
             <a:endParaRPr lang="en-US"/>
           </a:p>
@@ -593,7 +593,7 @@
           <a:p>
             <a:fld id="{49A02A90-E5B2-4178-83FD-9ED89742CA66}" type="datetimeFigureOut">
               <a:rPr lang="en-US" smtClean="0"/>
-              <a:t>12/19/2024</a:t>
+              <a:t>12/23/2024</a:t>
             </a:fld>
             <a:endParaRPr lang="en-US"/>
           </a:p>
@@ -763,7 +763,7 @@
           <a:p>
             <a:fld id="{49A02A90-E5B2-4178-83FD-9ED89742CA66}" type="datetimeFigureOut">
               <a:rPr lang="en-US" smtClean="0"/>
-              <a:t>12/19/2024</a:t>
+              <a:t>12/23/2024</a:t>
             </a:fld>
             <a:endParaRPr lang="en-US"/>
           </a:p>
@@ -1007,7 +1007,7 @@
           <a:p>
             <a:fld id="{49A02A90-E5B2-4178-83FD-9ED89742CA66}" type="datetimeFigureOut">
               <a:rPr lang="en-US" smtClean="0"/>
-              <a:t>12/19/2024</a:t>
+              <a:t>12/23/2024</a:t>
             </a:fld>
             <a:endParaRPr lang="en-US"/>
           </a:p>
@@ -1239,7 +1239,7 @@
           <a:p>
             <a:fld id="{49A02A90-E5B2-4178-83FD-9ED89742CA66}" type="datetimeFigureOut">
               <a:rPr lang="en-US" smtClean="0"/>
-              <a:t>12/19/2024</a:t>
+              <a:t>12/23/2024</a:t>
             </a:fld>
             <a:endParaRPr lang="en-US"/>
           </a:p>
@@ -1606,7 +1606,7 @@
           <a:p>
             <a:fld id="{49A02A90-E5B2-4178-83FD-9ED89742CA66}" type="datetimeFigureOut">
               <a:rPr lang="en-US" smtClean="0"/>
-              <a:t>12/19/2024</a:t>
+              <a:t>12/23/2024</a:t>
             </a:fld>
             <a:endParaRPr lang="en-US"/>
           </a:p>
@@ -1724,7 +1724,7 @@
           <a:p>
             <a:fld id="{49A02A90-E5B2-4178-83FD-9ED89742CA66}" type="datetimeFigureOut">
               <a:rPr lang="en-US" smtClean="0"/>
-              <a:t>12/19/2024</a:t>
+              <a:t>12/23/2024</a:t>
             </a:fld>
             <a:endParaRPr lang="en-US"/>
           </a:p>
@@ -1819,7 +1819,7 @@
           <a:p>
             <a:fld id="{49A02A90-E5B2-4178-83FD-9ED89742CA66}" type="datetimeFigureOut">
               <a:rPr lang="en-US" smtClean="0"/>
-              <a:t>12/19/2024</a:t>
+              <a:t>12/23/2024</a:t>
             </a:fld>
             <a:endParaRPr lang="en-US"/>
           </a:p>
@@ -2096,7 +2096,7 @@
           <a:p>
             <a:fld id="{49A02A90-E5B2-4178-83FD-9ED89742CA66}" type="datetimeFigureOut">
               <a:rPr lang="en-US" smtClean="0"/>
-              <a:t>12/19/2024</a:t>
+              <a:t>12/23/2024</a:t>
             </a:fld>
             <a:endParaRPr lang="en-US"/>
           </a:p>
@@ -2353,7 +2353,7 @@
           <a:p>
             <a:fld id="{49A02A90-E5B2-4178-83FD-9ED89742CA66}" type="datetimeFigureOut">
               <a:rPr lang="en-US" smtClean="0"/>
-              <a:t>12/19/2024</a:t>
+              <a:t>12/23/2024</a:t>
             </a:fld>
             <a:endParaRPr lang="en-US"/>
           </a:p>
@@ -2566,7 +2566,7 @@
           <a:p>
             <a:fld id="{49A02A90-E5B2-4178-83FD-9ED89742CA66}" type="datetimeFigureOut">
               <a:rPr lang="en-US" smtClean="0"/>
-              <a:t>12/19/2024</a:t>
+              <a:t>12/23/2024</a:t>
             </a:fld>
             <a:endParaRPr lang="en-US"/>
           </a:p>
@@ -3046,132 +3046,132 @@
         </p:nvSpPr>
         <p:spPr>
           <a:xfrm>
-            <a:off x="4639886" y="3750460"/>
-            <a:ext cx="11985553" cy="5632311"/>
+            <a:off x="3113209" y="6689391"/>
+            <a:ext cx="11985553" cy="5693866"/>
           </a:xfrm>
           <a:custGeom>
             <a:avLst/>
             <a:gdLst>
               <a:gd name="connsiteX0" fmla="*/ 0 w 11985553"/>
-              <a:gd name="connsiteY0" fmla="*/ 0 h 5632311"/>
+              <a:gd name="connsiteY0" fmla="*/ 0 h 5693866"/>
               <a:gd name="connsiteX1" fmla="*/ 479422 w 11985553"/>
-              <a:gd name="connsiteY1" fmla="*/ 0 h 5632311"/>
+              <a:gd name="connsiteY1" fmla="*/ 0 h 5693866"/>
               <a:gd name="connsiteX2" fmla="*/ 1198555 w 11985553"/>
-              <a:gd name="connsiteY2" fmla="*/ 0 h 5632311"/>
+              <a:gd name="connsiteY2" fmla="*/ 0 h 5693866"/>
               <a:gd name="connsiteX3" fmla="*/ 1677977 w 11985553"/>
-              <a:gd name="connsiteY3" fmla="*/ 0 h 5632311"/>
+              <a:gd name="connsiteY3" fmla="*/ 0 h 5693866"/>
               <a:gd name="connsiteX4" fmla="*/ 1917688 w 11985553"/>
-              <a:gd name="connsiteY4" fmla="*/ 0 h 5632311"/>
+              <a:gd name="connsiteY4" fmla="*/ 0 h 5693866"/>
               <a:gd name="connsiteX5" fmla="*/ 2277255 w 11985553"/>
-              <a:gd name="connsiteY5" fmla="*/ 0 h 5632311"/>
+              <a:gd name="connsiteY5" fmla="*/ 0 h 5693866"/>
               <a:gd name="connsiteX6" fmla="*/ 2996388 w 11985553"/>
-              <a:gd name="connsiteY6" fmla="*/ 0 h 5632311"/>
+              <a:gd name="connsiteY6" fmla="*/ 0 h 5693866"/>
               <a:gd name="connsiteX7" fmla="*/ 3595666 w 11985553"/>
-              <a:gd name="connsiteY7" fmla="*/ 0 h 5632311"/>
+              <a:gd name="connsiteY7" fmla="*/ 0 h 5693866"/>
               <a:gd name="connsiteX8" fmla="*/ 4075088 w 11985553"/>
-              <a:gd name="connsiteY8" fmla="*/ 0 h 5632311"/>
+              <a:gd name="connsiteY8" fmla="*/ 0 h 5693866"/>
               <a:gd name="connsiteX9" fmla="*/ 4914077 w 11985553"/>
-              <a:gd name="connsiteY9" fmla="*/ 0 h 5632311"/>
+              <a:gd name="connsiteY9" fmla="*/ 0 h 5693866"/>
               <a:gd name="connsiteX10" fmla="*/ 5393499 w 11985553"/>
-              <a:gd name="connsiteY10" fmla="*/ 0 h 5632311"/>
+              <a:gd name="connsiteY10" fmla="*/ 0 h 5693866"/>
               <a:gd name="connsiteX11" fmla="*/ 5633210 w 11985553"/>
-              <a:gd name="connsiteY11" fmla="*/ 0 h 5632311"/>
+              <a:gd name="connsiteY11" fmla="*/ 0 h 5693866"/>
               <a:gd name="connsiteX12" fmla="*/ 6472199 w 11985553"/>
-              <a:gd name="connsiteY12" fmla="*/ 0 h 5632311"/>
+              <a:gd name="connsiteY12" fmla="*/ 0 h 5693866"/>
               <a:gd name="connsiteX13" fmla="*/ 7191332 w 11985553"/>
-              <a:gd name="connsiteY13" fmla="*/ 0 h 5632311"/>
+              <a:gd name="connsiteY13" fmla="*/ 0 h 5693866"/>
               <a:gd name="connsiteX14" fmla="*/ 7790609 w 11985553"/>
-              <a:gd name="connsiteY14" fmla="*/ 0 h 5632311"/>
+              <a:gd name="connsiteY14" fmla="*/ 0 h 5693866"/>
               <a:gd name="connsiteX15" fmla="*/ 8509743 w 11985553"/>
-              <a:gd name="connsiteY15" fmla="*/ 0 h 5632311"/>
+              <a:gd name="connsiteY15" fmla="*/ 0 h 5693866"/>
               <a:gd name="connsiteX16" fmla="*/ 9228876 w 11985553"/>
-              <a:gd name="connsiteY16" fmla="*/ 0 h 5632311"/>
+              <a:gd name="connsiteY16" fmla="*/ 0 h 5693866"/>
               <a:gd name="connsiteX17" fmla="*/ 9948009 w 11985553"/>
-              <a:gd name="connsiteY17" fmla="*/ 0 h 5632311"/>
+              <a:gd name="connsiteY17" fmla="*/ 0 h 5693866"/>
               <a:gd name="connsiteX18" fmla="*/ 10667142 w 11985553"/>
-              <a:gd name="connsiteY18" fmla="*/ 0 h 5632311"/>
+              <a:gd name="connsiteY18" fmla="*/ 0 h 5693866"/>
               <a:gd name="connsiteX19" fmla="*/ 11985553 w 11985553"/>
-              <a:gd name="connsiteY19" fmla="*/ 0 h 5632311"/>
+              <a:gd name="connsiteY19" fmla="*/ 0 h 5693866"/>
               <a:gd name="connsiteX20" fmla="*/ 11985553 w 11985553"/>
-              <a:gd name="connsiteY20" fmla="*/ 450585 h 5632311"/>
+              <a:gd name="connsiteY20" fmla="*/ 455509 h 5693866"/>
               <a:gd name="connsiteX21" fmla="*/ 11985553 w 11985553"/>
-              <a:gd name="connsiteY21" fmla="*/ 1013816 h 5632311"/>
+              <a:gd name="connsiteY21" fmla="*/ 1024896 h 5693866"/>
               <a:gd name="connsiteX22" fmla="*/ 11985553 w 11985553"/>
-              <a:gd name="connsiteY22" fmla="*/ 1464401 h 5632311"/>
+              <a:gd name="connsiteY22" fmla="*/ 1480405 h 5693866"/>
               <a:gd name="connsiteX23" fmla="*/ 11985553 w 11985553"/>
-              <a:gd name="connsiteY23" fmla="*/ 1914986 h 5632311"/>
+              <a:gd name="connsiteY23" fmla="*/ 1935914 h 5693866"/>
               <a:gd name="connsiteX24" fmla="*/ 11985553 w 11985553"/>
-              <a:gd name="connsiteY24" fmla="*/ 2478217 h 5632311"/>
+              <a:gd name="connsiteY24" fmla="*/ 2505301 h 5693866"/>
               <a:gd name="connsiteX25" fmla="*/ 11985553 w 11985553"/>
-              <a:gd name="connsiteY25" fmla="*/ 3041448 h 5632311"/>
+              <a:gd name="connsiteY25" fmla="*/ 3074688 h 5693866"/>
               <a:gd name="connsiteX26" fmla="*/ 11985553 w 11985553"/>
-              <a:gd name="connsiteY26" fmla="*/ 3661002 h 5632311"/>
+              <a:gd name="connsiteY26" fmla="*/ 3701013 h 5693866"/>
               <a:gd name="connsiteX27" fmla="*/ 11985553 w 11985553"/>
-              <a:gd name="connsiteY27" fmla="*/ 4336879 h 5632311"/>
+              <a:gd name="connsiteY27" fmla="*/ 4384277 h 5693866"/>
               <a:gd name="connsiteX28" fmla="*/ 11985553 w 11985553"/>
-              <a:gd name="connsiteY28" fmla="*/ 4900111 h 5632311"/>
+              <a:gd name="connsiteY28" fmla="*/ 4953663 h 5693866"/>
               <a:gd name="connsiteX29" fmla="*/ 11985553 w 11985553"/>
-              <a:gd name="connsiteY29" fmla="*/ 5632311 h 5632311"/>
+              <a:gd name="connsiteY29" fmla="*/ 5693866 h 5693866"/>
               <a:gd name="connsiteX30" fmla="*/ 11266420 w 11985553"/>
-              <a:gd name="connsiteY30" fmla="*/ 5632311 h 5632311"/>
+              <a:gd name="connsiteY30" fmla="*/ 5693866 h 5693866"/>
               <a:gd name="connsiteX31" fmla="*/ 10547287 w 11985553"/>
-              <a:gd name="connsiteY31" fmla="*/ 5632311 h 5632311"/>
+              <a:gd name="connsiteY31" fmla="*/ 5693866 h 5693866"/>
               <a:gd name="connsiteX32" fmla="*/ 10187720 w 11985553"/>
-              <a:gd name="connsiteY32" fmla="*/ 5632311 h 5632311"/>
+              <a:gd name="connsiteY32" fmla="*/ 5693866 h 5693866"/>
               <a:gd name="connsiteX33" fmla="*/ 9948009 w 11985553"/>
-              <a:gd name="connsiteY33" fmla="*/ 5632311 h 5632311"/>
+              <a:gd name="connsiteY33" fmla="*/ 5693866 h 5693866"/>
               <a:gd name="connsiteX34" fmla="*/ 9348731 w 11985553"/>
-              <a:gd name="connsiteY34" fmla="*/ 5632311 h 5632311"/>
+              <a:gd name="connsiteY34" fmla="*/ 5693866 h 5693866"/>
               <a:gd name="connsiteX35" fmla="*/ 8509743 w 11985553"/>
-              <a:gd name="connsiteY35" fmla="*/ 5632311 h 5632311"/>
+              <a:gd name="connsiteY35" fmla="*/ 5693866 h 5693866"/>
               <a:gd name="connsiteX36" fmla="*/ 8150176 w 11985553"/>
-              <a:gd name="connsiteY36" fmla="*/ 5632311 h 5632311"/>
+              <a:gd name="connsiteY36" fmla="*/ 5693866 h 5693866"/>
               <a:gd name="connsiteX37" fmla="*/ 7311187 w 11985553"/>
-              <a:gd name="connsiteY37" fmla="*/ 5632311 h 5632311"/>
+              <a:gd name="connsiteY37" fmla="*/ 5693866 h 5693866"/>
               <a:gd name="connsiteX38" fmla="*/ 6472199 w 11985553"/>
-              <a:gd name="connsiteY38" fmla="*/ 5632311 h 5632311"/>
+              <a:gd name="connsiteY38" fmla="*/ 5693866 h 5693866"/>
               <a:gd name="connsiteX39" fmla="*/ 5872921 w 11985553"/>
-              <a:gd name="connsiteY39" fmla="*/ 5632311 h 5632311"/>
+              <a:gd name="connsiteY39" fmla="*/ 5693866 h 5693866"/>
               <a:gd name="connsiteX40" fmla="*/ 5633210 w 11985553"/>
-              <a:gd name="connsiteY40" fmla="*/ 5632311 h 5632311"/>
+              <a:gd name="connsiteY40" fmla="*/ 5693866 h 5693866"/>
               <a:gd name="connsiteX41" fmla="*/ 5033932 w 11985553"/>
-              <a:gd name="connsiteY41" fmla="*/ 5632311 h 5632311"/>
+              <a:gd name="connsiteY41" fmla="*/ 5693866 h 5693866"/>
               <a:gd name="connsiteX42" fmla="*/ 4194944 w 11985553"/>
-              <a:gd name="connsiteY42" fmla="*/ 5632311 h 5632311"/>
+              <a:gd name="connsiteY42" fmla="*/ 5693866 h 5693866"/>
               <a:gd name="connsiteX43" fmla="*/ 3355955 w 11985553"/>
-              <a:gd name="connsiteY43" fmla="*/ 5632311 h 5632311"/>
+              <a:gd name="connsiteY43" fmla="*/ 5693866 h 5693866"/>
               <a:gd name="connsiteX44" fmla="*/ 2876533 w 11985553"/>
-              <a:gd name="connsiteY44" fmla="*/ 5632311 h 5632311"/>
+              <a:gd name="connsiteY44" fmla="*/ 5693866 h 5693866"/>
               <a:gd name="connsiteX45" fmla="*/ 2636822 w 11985553"/>
-              <a:gd name="connsiteY45" fmla="*/ 5632311 h 5632311"/>
+              <a:gd name="connsiteY45" fmla="*/ 5693866 h 5693866"/>
               <a:gd name="connsiteX46" fmla="*/ 2037544 w 11985553"/>
-              <a:gd name="connsiteY46" fmla="*/ 5632311 h 5632311"/>
+              <a:gd name="connsiteY46" fmla="*/ 5693866 h 5693866"/>
               <a:gd name="connsiteX47" fmla="*/ 1438266 w 11985553"/>
-              <a:gd name="connsiteY47" fmla="*/ 5632311 h 5632311"/>
+              <a:gd name="connsiteY47" fmla="*/ 5693866 h 5693866"/>
               <a:gd name="connsiteX48" fmla="*/ 958844 w 11985553"/>
-              <a:gd name="connsiteY48" fmla="*/ 5632311 h 5632311"/>
+              <a:gd name="connsiteY48" fmla="*/ 5693866 h 5693866"/>
               <a:gd name="connsiteX49" fmla="*/ 719133 w 11985553"/>
-              <a:gd name="connsiteY49" fmla="*/ 5632311 h 5632311"/>
+              <a:gd name="connsiteY49" fmla="*/ 5693866 h 5693866"/>
               <a:gd name="connsiteX50" fmla="*/ 0 w 11985553"/>
-              <a:gd name="connsiteY50" fmla="*/ 5632311 h 5632311"/>
+              <a:gd name="connsiteY50" fmla="*/ 5693866 h 5693866"/>
               <a:gd name="connsiteX51" fmla="*/ 0 w 11985553"/>
-              <a:gd name="connsiteY51" fmla="*/ 5181726 h 5632311"/>
+              <a:gd name="connsiteY51" fmla="*/ 5238357 h 5693866"/>
               <a:gd name="connsiteX52" fmla="*/ 0 w 11985553"/>
-              <a:gd name="connsiteY52" fmla="*/ 4505849 h 5632311"/>
+              <a:gd name="connsiteY52" fmla="*/ 4555093 h 5693866"/>
               <a:gd name="connsiteX53" fmla="*/ 0 w 11985553"/>
-              <a:gd name="connsiteY53" fmla="*/ 3829971 h 5632311"/>
+              <a:gd name="connsiteY53" fmla="*/ 3871829 h 5693866"/>
               <a:gd name="connsiteX54" fmla="*/ 0 w 11985553"/>
-              <a:gd name="connsiteY54" fmla="*/ 3266740 h 5632311"/>
+              <a:gd name="connsiteY54" fmla="*/ 3302442 h 5693866"/>
               <a:gd name="connsiteX55" fmla="*/ 0 w 11985553"/>
-              <a:gd name="connsiteY55" fmla="*/ 2759832 h 5632311"/>
+              <a:gd name="connsiteY55" fmla="*/ 2789994 h 5693866"/>
               <a:gd name="connsiteX56" fmla="*/ 0 w 11985553"/>
-              <a:gd name="connsiteY56" fmla="*/ 2083955 h 5632311"/>
+              <a:gd name="connsiteY56" fmla="*/ 2106730 h 5693866"/>
               <a:gd name="connsiteX57" fmla="*/ 0 w 11985553"/>
-              <a:gd name="connsiteY57" fmla="*/ 1577047 h 5632311"/>
+              <a:gd name="connsiteY57" fmla="*/ 1594282 h 5693866"/>
               <a:gd name="connsiteX58" fmla="*/ 0 w 11985553"/>
-              <a:gd name="connsiteY58" fmla="*/ 1070139 h 5632311"/>
+              <a:gd name="connsiteY58" fmla="*/ 1081835 h 5693866"/>
               <a:gd name="connsiteX59" fmla="*/ 0 w 11985553"/>
-              <a:gd name="connsiteY59" fmla="*/ 0 h 5632311"/>
+              <a:gd name="connsiteY59" fmla="*/ 0 h 5693866"/>
             </a:gdLst>
             <a:ahLst/>
             <a:cxnLst>
@@ -3358,7 +3358,7 @@
             </a:cxnLst>
             <a:rect l="l" t="t" r="r" b="b"/>
             <a:pathLst>
-              <a:path w="11985553" h="5632311" fill="none" extrusionOk="0">
+              <a:path w="11985553" h="5693866" fill="none" extrusionOk="0">
                 <a:moveTo>
                   <a:pt x="0" y="0"/>
                 </a:moveTo>
@@ -3458,208 +3458,208 @@
                   <a:pt x="11985553" y="0"/>
                 </a:cubicBezTo>
                 <a:cubicBezTo>
-                  <a:pt x="12016588" y="147946"/>
-                  <a:pt x="11959842" y="298019"/>
-                  <a:pt x="11985553" y="450585"/>
-                </a:cubicBezTo>
-                <a:cubicBezTo>
-                  <a:pt x="12011264" y="603152"/>
-                  <a:pt x="11945475" y="825931"/>
-                  <a:pt x="11985553" y="1013816"/>
-                </a:cubicBezTo>
-                <a:cubicBezTo>
-                  <a:pt x="12025631" y="1201701"/>
-                  <a:pt x="11941588" y="1315561"/>
-                  <a:pt x="11985553" y="1464401"/>
-                </a:cubicBezTo>
-                <a:cubicBezTo>
-                  <a:pt x="12029518" y="1613241"/>
-                  <a:pt x="11974363" y="1724237"/>
-                  <a:pt x="11985553" y="1914986"/>
-                </a:cubicBezTo>
-                <a:cubicBezTo>
-                  <a:pt x="11996743" y="2105735"/>
-                  <a:pt x="11946921" y="2307737"/>
-                  <a:pt x="11985553" y="2478217"/>
-                </a:cubicBezTo>
-                <a:cubicBezTo>
-                  <a:pt x="12024185" y="2648697"/>
-                  <a:pt x="11922117" y="2829214"/>
-                  <a:pt x="11985553" y="3041448"/>
-                </a:cubicBezTo>
-                <a:cubicBezTo>
-                  <a:pt x="12048989" y="3253682"/>
-                  <a:pt x="11936566" y="3456845"/>
-                  <a:pt x="11985553" y="3661002"/>
-                </a:cubicBezTo>
-                <a:cubicBezTo>
-                  <a:pt x="12034540" y="3865159"/>
-                  <a:pt x="11946974" y="4087246"/>
-                  <a:pt x="11985553" y="4336879"/>
-                </a:cubicBezTo>
-                <a:cubicBezTo>
-                  <a:pt x="12024132" y="4586512"/>
-                  <a:pt x="11924077" y="4683631"/>
-                  <a:pt x="11985553" y="4900111"/>
-                </a:cubicBezTo>
-                <a:cubicBezTo>
-                  <a:pt x="12047029" y="5116591"/>
-                  <a:pt x="11950986" y="5460932"/>
-                  <a:pt x="11985553" y="5632311"/>
-                </a:cubicBezTo>
-                <a:cubicBezTo>
-                  <a:pt x="11776394" y="5681020"/>
-                  <a:pt x="11502656" y="5556470"/>
-                  <a:pt x="11266420" y="5632311"/>
-                </a:cubicBezTo>
-                <a:cubicBezTo>
-                  <a:pt x="11030184" y="5708152"/>
-                  <a:pt x="10801673" y="5629991"/>
-                  <a:pt x="10547287" y="5632311"/>
-                </a:cubicBezTo>
-                <a:cubicBezTo>
-                  <a:pt x="10292901" y="5634631"/>
-                  <a:pt x="10327912" y="5595428"/>
-                  <a:pt x="10187720" y="5632311"/>
-                </a:cubicBezTo>
-                <a:cubicBezTo>
-                  <a:pt x="10047528" y="5669194"/>
-                  <a:pt x="10065323" y="5615185"/>
-                  <a:pt x="9948009" y="5632311"/>
-                </a:cubicBezTo>
-                <a:cubicBezTo>
-                  <a:pt x="9830695" y="5649437"/>
-                  <a:pt x="9507906" y="5580597"/>
-                  <a:pt x="9348731" y="5632311"/>
-                </a:cubicBezTo>
-                <a:cubicBezTo>
-                  <a:pt x="9189556" y="5684025"/>
-                  <a:pt x="8916768" y="5627498"/>
-                  <a:pt x="8509743" y="5632311"/>
-                </a:cubicBezTo>
-                <a:cubicBezTo>
-                  <a:pt x="8102718" y="5637124"/>
-                  <a:pt x="8292712" y="5632280"/>
-                  <a:pt x="8150176" y="5632311"/>
-                </a:cubicBezTo>
-                <a:cubicBezTo>
-                  <a:pt x="8007640" y="5632342"/>
-                  <a:pt x="7695694" y="5534967"/>
-                  <a:pt x="7311187" y="5632311"/>
-                </a:cubicBezTo>
-                <a:cubicBezTo>
-                  <a:pt x="6926680" y="5729655"/>
-                  <a:pt x="6848965" y="5594865"/>
-                  <a:pt x="6472199" y="5632311"/>
-                </a:cubicBezTo>
-                <a:cubicBezTo>
-                  <a:pt x="6095433" y="5669757"/>
-                  <a:pt x="6075842" y="5616996"/>
-                  <a:pt x="5872921" y="5632311"/>
-                </a:cubicBezTo>
-                <a:cubicBezTo>
-                  <a:pt x="5670000" y="5647626"/>
-                  <a:pt x="5689551" y="5628850"/>
-                  <a:pt x="5633210" y="5632311"/>
-                </a:cubicBezTo>
-                <a:cubicBezTo>
-                  <a:pt x="5576869" y="5635772"/>
-                  <a:pt x="5312299" y="5618481"/>
-                  <a:pt x="5033932" y="5632311"/>
-                </a:cubicBezTo>
-                <a:cubicBezTo>
-                  <a:pt x="4755565" y="5646141"/>
-                  <a:pt x="4575453" y="5565983"/>
-                  <a:pt x="4194944" y="5632311"/>
-                </a:cubicBezTo>
-                <a:cubicBezTo>
-                  <a:pt x="3814435" y="5698639"/>
-                  <a:pt x="3581429" y="5554609"/>
-                  <a:pt x="3355955" y="5632311"/>
-                </a:cubicBezTo>
-                <a:cubicBezTo>
-                  <a:pt x="3130481" y="5710013"/>
-                  <a:pt x="3067634" y="5598196"/>
-                  <a:pt x="2876533" y="5632311"/>
-                </a:cubicBezTo>
-                <a:cubicBezTo>
-                  <a:pt x="2685432" y="5666426"/>
-                  <a:pt x="2688822" y="5621594"/>
-                  <a:pt x="2636822" y="5632311"/>
-                </a:cubicBezTo>
-                <a:cubicBezTo>
-                  <a:pt x="2584822" y="5643028"/>
-                  <a:pt x="2255630" y="5578097"/>
-                  <a:pt x="2037544" y="5632311"/>
-                </a:cubicBezTo>
-                <a:cubicBezTo>
-                  <a:pt x="1819458" y="5686525"/>
-                  <a:pt x="1659386" y="5618581"/>
-                  <a:pt x="1438266" y="5632311"/>
-                </a:cubicBezTo>
-                <a:cubicBezTo>
-                  <a:pt x="1217146" y="5646041"/>
-                  <a:pt x="1196229" y="5604100"/>
-                  <a:pt x="958844" y="5632311"/>
-                </a:cubicBezTo>
-                <a:cubicBezTo>
-                  <a:pt x="721459" y="5660522"/>
-                  <a:pt x="779681" y="5616376"/>
-                  <a:pt x="719133" y="5632311"/>
-                </a:cubicBezTo>
-                <a:cubicBezTo>
-                  <a:pt x="658585" y="5648246"/>
-                  <a:pt x="345473" y="5610230"/>
-                  <a:pt x="0" y="5632311"/>
-                </a:cubicBezTo>
-                <a:cubicBezTo>
-                  <a:pt x="-13658" y="5461078"/>
-                  <a:pt x="33675" y="5324713"/>
-                  <a:pt x="0" y="5181726"/>
-                </a:cubicBezTo>
-                <a:cubicBezTo>
-                  <a:pt x="-33675" y="5038740"/>
-                  <a:pt x="34477" y="4731776"/>
-                  <a:pt x="0" y="4505849"/>
-                </a:cubicBezTo>
-                <a:cubicBezTo>
-                  <a:pt x="-34477" y="4279922"/>
-                  <a:pt x="25997" y="3997098"/>
-                  <a:pt x="0" y="3829971"/>
-                </a:cubicBezTo>
-                <a:cubicBezTo>
-                  <a:pt x="-25997" y="3662844"/>
-                  <a:pt x="51861" y="3446547"/>
-                  <a:pt x="0" y="3266740"/>
-                </a:cubicBezTo>
-                <a:cubicBezTo>
-                  <a:pt x="-51861" y="3086933"/>
-                  <a:pt x="48263" y="2986878"/>
-                  <a:pt x="0" y="2759832"/>
-                </a:cubicBezTo>
-                <a:cubicBezTo>
-                  <a:pt x="-48263" y="2532786"/>
-                  <a:pt x="1599" y="2375758"/>
-                  <a:pt x="0" y="2083955"/>
-                </a:cubicBezTo>
-                <a:cubicBezTo>
-                  <a:pt x="-1599" y="1792152"/>
-                  <a:pt x="57174" y="1816414"/>
-                  <a:pt x="0" y="1577047"/>
-                </a:cubicBezTo>
-                <a:cubicBezTo>
-                  <a:pt x="-57174" y="1337680"/>
-                  <a:pt x="3483" y="1227590"/>
-                  <a:pt x="0" y="1070139"/>
-                </a:cubicBezTo>
-                <a:cubicBezTo>
-                  <a:pt x="-3483" y="912688"/>
-                  <a:pt x="61289" y="423997"/>
+                  <a:pt x="12007798" y="134611"/>
+                  <a:pt x="11952423" y="277995"/>
+                  <a:pt x="11985553" y="455509"/>
+                </a:cubicBezTo>
+                <a:cubicBezTo>
+                  <a:pt x="12018683" y="633023"/>
+                  <a:pt x="11945074" y="781325"/>
+                  <a:pt x="11985553" y="1024896"/>
+                </a:cubicBezTo>
+                <a:cubicBezTo>
+                  <a:pt x="12026032" y="1268467"/>
+                  <a:pt x="11947974" y="1348745"/>
+                  <a:pt x="11985553" y="1480405"/>
+                </a:cubicBezTo>
+                <a:cubicBezTo>
+                  <a:pt x="12023132" y="1612065"/>
+                  <a:pt x="11985015" y="1760506"/>
+                  <a:pt x="11985553" y="1935914"/>
+                </a:cubicBezTo>
+                <a:cubicBezTo>
+                  <a:pt x="11986091" y="2111322"/>
+                  <a:pt x="11973171" y="2266500"/>
+                  <a:pt x="11985553" y="2505301"/>
+                </a:cubicBezTo>
+                <a:cubicBezTo>
+                  <a:pt x="11997935" y="2744102"/>
+                  <a:pt x="11932716" y="2834361"/>
+                  <a:pt x="11985553" y="3074688"/>
+                </a:cubicBezTo>
+                <a:cubicBezTo>
+                  <a:pt x="12038390" y="3315015"/>
+                  <a:pt x="11910912" y="3456558"/>
+                  <a:pt x="11985553" y="3701013"/>
+                </a:cubicBezTo>
+                <a:cubicBezTo>
+                  <a:pt x="12060194" y="3945469"/>
+                  <a:pt x="11981704" y="4168077"/>
+                  <a:pt x="11985553" y="4384277"/>
+                </a:cubicBezTo>
+                <a:cubicBezTo>
+                  <a:pt x="11989402" y="4600477"/>
+                  <a:pt x="11967713" y="4674758"/>
+                  <a:pt x="11985553" y="4953663"/>
+                </a:cubicBezTo>
+                <a:cubicBezTo>
+                  <a:pt x="12003393" y="5232568"/>
+                  <a:pt x="11969354" y="5373288"/>
+                  <a:pt x="11985553" y="5693866"/>
+                </a:cubicBezTo>
+                <a:cubicBezTo>
+                  <a:pt x="11776394" y="5742575"/>
+                  <a:pt x="11502656" y="5618025"/>
+                  <a:pt x="11266420" y="5693866"/>
+                </a:cubicBezTo>
+                <a:cubicBezTo>
+                  <a:pt x="11030184" y="5769707"/>
+                  <a:pt x="10801673" y="5691546"/>
+                  <a:pt x="10547287" y="5693866"/>
+                </a:cubicBezTo>
+                <a:cubicBezTo>
+                  <a:pt x="10292901" y="5696186"/>
+                  <a:pt x="10327912" y="5656983"/>
+                  <a:pt x="10187720" y="5693866"/>
+                </a:cubicBezTo>
+                <a:cubicBezTo>
+                  <a:pt x="10047528" y="5730749"/>
+                  <a:pt x="10065323" y="5676740"/>
+                  <a:pt x="9948009" y="5693866"/>
+                </a:cubicBezTo>
+                <a:cubicBezTo>
+                  <a:pt x="9830695" y="5710992"/>
+                  <a:pt x="9507906" y="5642152"/>
+                  <a:pt x="9348731" y="5693866"/>
+                </a:cubicBezTo>
+                <a:cubicBezTo>
+                  <a:pt x="9189556" y="5745580"/>
+                  <a:pt x="8916768" y="5689053"/>
+                  <a:pt x="8509743" y="5693866"/>
+                </a:cubicBezTo>
+                <a:cubicBezTo>
+                  <a:pt x="8102718" y="5698679"/>
+                  <a:pt x="8292712" y="5693835"/>
+                  <a:pt x="8150176" y="5693866"/>
+                </a:cubicBezTo>
+                <a:cubicBezTo>
+                  <a:pt x="8007640" y="5693897"/>
+                  <a:pt x="7695694" y="5596522"/>
+                  <a:pt x="7311187" y="5693866"/>
+                </a:cubicBezTo>
+                <a:cubicBezTo>
+                  <a:pt x="6926680" y="5791210"/>
+                  <a:pt x="6848965" y="5656420"/>
+                  <a:pt x="6472199" y="5693866"/>
+                </a:cubicBezTo>
+                <a:cubicBezTo>
+                  <a:pt x="6095433" y="5731312"/>
+                  <a:pt x="6075842" y="5678551"/>
+                  <a:pt x="5872921" y="5693866"/>
+                </a:cubicBezTo>
+                <a:cubicBezTo>
+                  <a:pt x="5670000" y="5709181"/>
+                  <a:pt x="5689551" y="5690405"/>
+                  <a:pt x="5633210" y="5693866"/>
+                </a:cubicBezTo>
+                <a:cubicBezTo>
+                  <a:pt x="5576869" y="5697327"/>
+                  <a:pt x="5312299" y="5680036"/>
+                  <a:pt x="5033932" y="5693866"/>
+                </a:cubicBezTo>
+                <a:cubicBezTo>
+                  <a:pt x="4755565" y="5707696"/>
+                  <a:pt x="4575453" y="5627538"/>
+                  <a:pt x="4194944" y="5693866"/>
+                </a:cubicBezTo>
+                <a:cubicBezTo>
+                  <a:pt x="3814435" y="5760194"/>
+                  <a:pt x="3581429" y="5616164"/>
+                  <a:pt x="3355955" y="5693866"/>
+                </a:cubicBezTo>
+                <a:cubicBezTo>
+                  <a:pt x="3130481" y="5771568"/>
+                  <a:pt x="3067634" y="5659751"/>
+                  <a:pt x="2876533" y="5693866"/>
+                </a:cubicBezTo>
+                <a:cubicBezTo>
+                  <a:pt x="2685432" y="5727981"/>
+                  <a:pt x="2688822" y="5683149"/>
+                  <a:pt x="2636822" y="5693866"/>
+                </a:cubicBezTo>
+                <a:cubicBezTo>
+                  <a:pt x="2584822" y="5704583"/>
+                  <a:pt x="2255630" y="5639652"/>
+                  <a:pt x="2037544" y="5693866"/>
+                </a:cubicBezTo>
+                <a:cubicBezTo>
+                  <a:pt x="1819458" y="5748080"/>
+                  <a:pt x="1659386" y="5680136"/>
+                  <a:pt x="1438266" y="5693866"/>
+                </a:cubicBezTo>
+                <a:cubicBezTo>
+                  <a:pt x="1217146" y="5707596"/>
+                  <a:pt x="1196229" y="5665655"/>
+                  <a:pt x="958844" y="5693866"/>
+                </a:cubicBezTo>
+                <a:cubicBezTo>
+                  <a:pt x="721459" y="5722077"/>
+                  <a:pt x="779681" y="5677931"/>
+                  <a:pt x="719133" y="5693866"/>
+                </a:cubicBezTo>
+                <a:cubicBezTo>
+                  <a:pt x="658585" y="5709801"/>
+                  <a:pt x="345473" y="5671785"/>
+                  <a:pt x="0" y="5693866"/>
+                </a:cubicBezTo>
+                <a:cubicBezTo>
+                  <a:pt x="-23886" y="5513551"/>
+                  <a:pt x="44128" y="5461320"/>
+                  <a:pt x="0" y="5238357"/>
+                </a:cubicBezTo>
+                <a:cubicBezTo>
+                  <a:pt x="-44128" y="5015394"/>
+                  <a:pt x="70017" y="4789984"/>
+                  <a:pt x="0" y="4555093"/>
+                </a:cubicBezTo>
+                <a:cubicBezTo>
+                  <a:pt x="-70017" y="4320202"/>
+                  <a:pt x="41580" y="4117761"/>
+                  <a:pt x="0" y="3871829"/>
+                </a:cubicBezTo>
+                <a:cubicBezTo>
+                  <a:pt x="-41580" y="3625897"/>
+                  <a:pt x="50923" y="3552043"/>
+                  <a:pt x="0" y="3302442"/>
+                </a:cubicBezTo>
+                <a:cubicBezTo>
+                  <a:pt x="-50923" y="3052841"/>
+                  <a:pt x="23625" y="2916745"/>
+                  <a:pt x="0" y="2789994"/>
+                </a:cubicBezTo>
+                <a:cubicBezTo>
+                  <a:pt x="-23625" y="2663243"/>
+                  <a:pt x="6735" y="2345930"/>
+                  <a:pt x="0" y="2106730"/>
+                </a:cubicBezTo>
+                <a:cubicBezTo>
+                  <a:pt x="-6735" y="1867530"/>
+                  <a:pt x="51057" y="1764016"/>
+                  <a:pt x="0" y="1594282"/>
+                </a:cubicBezTo>
+                <a:cubicBezTo>
+                  <a:pt x="-51057" y="1424548"/>
+                  <a:pt x="34766" y="1336085"/>
+                  <a:pt x="0" y="1081835"/>
+                </a:cubicBezTo>
+                <a:cubicBezTo>
+                  <a:pt x="-34766" y="827585"/>
+                  <a:pt x="61624" y="450006"/>
                   <a:pt x="0" y="0"/>
                 </a:cubicBezTo>
                 <a:close/>
               </a:path>
-              <a:path w="11985553" h="5632311" stroke="0" extrusionOk="0">
+              <a:path w="11985553" h="5693866" stroke="0" extrusionOk="0">
                 <a:moveTo>
                   <a:pt x="0" y="0"/>
                 </a:moveTo>
@@ -3769,203 +3769,203 @@
                   <a:pt x="11985553" y="0"/>
                 </a:cubicBezTo>
                 <a:cubicBezTo>
-                  <a:pt x="11994842" y="165647"/>
-                  <a:pt x="11947572" y="310629"/>
-                  <a:pt x="11985553" y="506908"/>
-                </a:cubicBezTo>
-                <a:cubicBezTo>
-                  <a:pt x="12023534" y="703187"/>
-                  <a:pt x="11940869" y="743340"/>
-                  <a:pt x="11985553" y="957493"/>
-                </a:cubicBezTo>
-                <a:cubicBezTo>
-                  <a:pt x="12030237" y="1171646"/>
-                  <a:pt x="11984501" y="1448919"/>
-                  <a:pt x="11985553" y="1577047"/>
-                </a:cubicBezTo>
-                <a:cubicBezTo>
-                  <a:pt x="11986605" y="1705175"/>
-                  <a:pt x="11955899" y="2009110"/>
-                  <a:pt x="11985553" y="2252924"/>
-                </a:cubicBezTo>
-                <a:cubicBezTo>
-                  <a:pt x="12015207" y="2496738"/>
-                  <a:pt x="11978309" y="2664770"/>
-                  <a:pt x="11985553" y="2872479"/>
-                </a:cubicBezTo>
-                <a:cubicBezTo>
-                  <a:pt x="11992797" y="3080188"/>
-                  <a:pt x="11971569" y="3160850"/>
-                  <a:pt x="11985553" y="3435710"/>
-                </a:cubicBezTo>
-                <a:cubicBezTo>
-                  <a:pt x="11999537" y="3710570"/>
-                  <a:pt x="11935042" y="3782318"/>
-                  <a:pt x="11985553" y="3942618"/>
-                </a:cubicBezTo>
-                <a:cubicBezTo>
-                  <a:pt x="12036064" y="4102918"/>
-                  <a:pt x="11932052" y="4284283"/>
-                  <a:pt x="11985553" y="4449526"/>
-                </a:cubicBezTo>
-                <a:cubicBezTo>
-                  <a:pt x="12039054" y="4614769"/>
-                  <a:pt x="11949669" y="4719366"/>
-                  <a:pt x="11985553" y="4900111"/>
-                </a:cubicBezTo>
-                <a:cubicBezTo>
-                  <a:pt x="12021437" y="5080857"/>
-                  <a:pt x="11898830" y="5453306"/>
-                  <a:pt x="11985553" y="5632311"/>
-                </a:cubicBezTo>
-                <a:cubicBezTo>
-                  <a:pt x="11835731" y="5635838"/>
-                  <a:pt x="11740831" y="5588529"/>
-                  <a:pt x="11506131" y="5632311"/>
-                </a:cubicBezTo>
-                <a:cubicBezTo>
-                  <a:pt x="11271431" y="5676093"/>
-                  <a:pt x="11112384" y="5612873"/>
-                  <a:pt x="10906853" y="5632311"/>
-                </a:cubicBezTo>
-                <a:cubicBezTo>
-                  <a:pt x="10701322" y="5651749"/>
-                  <a:pt x="10560933" y="5603043"/>
-                  <a:pt x="10427431" y="5632311"/>
-                </a:cubicBezTo>
-                <a:cubicBezTo>
-                  <a:pt x="10293929" y="5661579"/>
-                  <a:pt x="10038985" y="5603188"/>
-                  <a:pt x="9708298" y="5632311"/>
-                </a:cubicBezTo>
-                <a:cubicBezTo>
-                  <a:pt x="9377611" y="5661434"/>
-                  <a:pt x="9038438" y="5609272"/>
-                  <a:pt x="8869309" y="5632311"/>
-                </a:cubicBezTo>
-                <a:cubicBezTo>
-                  <a:pt x="8700180" y="5655350"/>
-                  <a:pt x="8507128" y="5568698"/>
-                  <a:pt x="8270032" y="5632311"/>
-                </a:cubicBezTo>
-                <a:cubicBezTo>
-                  <a:pt x="8032936" y="5695924"/>
-                  <a:pt x="8017627" y="5591065"/>
-                  <a:pt x="7790609" y="5632311"/>
-                </a:cubicBezTo>
-                <a:cubicBezTo>
-                  <a:pt x="7563591" y="5673557"/>
-                  <a:pt x="7345637" y="5628636"/>
-                  <a:pt x="7191332" y="5632311"/>
-                </a:cubicBezTo>
-                <a:cubicBezTo>
-                  <a:pt x="7037027" y="5635986"/>
-                  <a:pt x="6732570" y="5601454"/>
-                  <a:pt x="6352343" y="5632311"/>
-                </a:cubicBezTo>
-                <a:cubicBezTo>
-                  <a:pt x="5972116" y="5663168"/>
-                  <a:pt x="6207235" y="5605181"/>
-                  <a:pt x="6112632" y="5632311"/>
-                </a:cubicBezTo>
-                <a:cubicBezTo>
-                  <a:pt x="6018029" y="5659441"/>
-                  <a:pt x="5806001" y="5602140"/>
-                  <a:pt x="5633210" y="5632311"/>
-                </a:cubicBezTo>
-                <a:cubicBezTo>
-                  <a:pt x="5460419" y="5662482"/>
-                  <a:pt x="5180704" y="5580979"/>
-                  <a:pt x="5033932" y="5632311"/>
-                </a:cubicBezTo>
-                <a:cubicBezTo>
-                  <a:pt x="4887160" y="5683643"/>
-                  <a:pt x="4536726" y="5561377"/>
-                  <a:pt x="4194944" y="5632311"/>
-                </a:cubicBezTo>
-                <a:cubicBezTo>
-                  <a:pt x="3853162" y="5703245"/>
-                  <a:pt x="3884934" y="5596641"/>
-                  <a:pt x="3595666" y="5632311"/>
-                </a:cubicBezTo>
-                <a:cubicBezTo>
-                  <a:pt x="3306398" y="5667981"/>
-                  <a:pt x="3302325" y="5590970"/>
-                  <a:pt x="3116244" y="5632311"/>
-                </a:cubicBezTo>
-                <a:cubicBezTo>
-                  <a:pt x="2930163" y="5673652"/>
-                  <a:pt x="2822065" y="5603642"/>
-                  <a:pt x="2636822" y="5632311"/>
-                </a:cubicBezTo>
-                <a:cubicBezTo>
-                  <a:pt x="2451579" y="5660980"/>
-                  <a:pt x="2225446" y="5602622"/>
-                  <a:pt x="1917688" y="5632311"/>
-                </a:cubicBezTo>
-                <a:cubicBezTo>
-                  <a:pt x="1609930" y="5662000"/>
-                  <a:pt x="1667508" y="5619662"/>
-                  <a:pt x="1558122" y="5632311"/>
-                </a:cubicBezTo>
-                <a:cubicBezTo>
-                  <a:pt x="1448736" y="5644960"/>
-                  <a:pt x="1096321" y="5583551"/>
-                  <a:pt x="958844" y="5632311"/>
-                </a:cubicBezTo>
-                <a:cubicBezTo>
-                  <a:pt x="821367" y="5681071"/>
-                  <a:pt x="375054" y="5518655"/>
-                  <a:pt x="0" y="5632311"/>
-                </a:cubicBezTo>
-                <a:cubicBezTo>
-                  <a:pt x="-29339" y="5525039"/>
-                  <a:pt x="33327" y="5379414"/>
-                  <a:pt x="0" y="5238049"/>
-                </a:cubicBezTo>
-                <a:cubicBezTo>
-                  <a:pt x="-33327" y="5096684"/>
-                  <a:pt x="42776" y="4890536"/>
-                  <a:pt x="0" y="4618495"/>
-                </a:cubicBezTo>
-                <a:cubicBezTo>
-                  <a:pt x="-42776" y="4346454"/>
-                  <a:pt x="21883" y="4223170"/>
-                  <a:pt x="0" y="3942618"/>
-                </a:cubicBezTo>
-                <a:cubicBezTo>
-                  <a:pt x="-21883" y="3662066"/>
-                  <a:pt x="12418" y="3612665"/>
-                  <a:pt x="0" y="3379387"/>
-                </a:cubicBezTo>
-                <a:cubicBezTo>
-                  <a:pt x="-12418" y="3146109"/>
-                  <a:pt x="12071" y="3039232"/>
-                  <a:pt x="0" y="2872479"/>
-                </a:cubicBezTo>
-                <a:cubicBezTo>
-                  <a:pt x="-12071" y="2705726"/>
-                  <a:pt x="17129" y="2479454"/>
-                  <a:pt x="0" y="2252924"/>
-                </a:cubicBezTo>
-                <a:cubicBezTo>
-                  <a:pt x="-17129" y="2026394"/>
-                  <a:pt x="58092" y="1817813"/>
-                  <a:pt x="0" y="1633370"/>
-                </a:cubicBezTo>
-                <a:cubicBezTo>
-                  <a:pt x="-58092" y="1448927"/>
-                  <a:pt x="36089" y="1416860"/>
-                  <a:pt x="0" y="1239108"/>
-                </a:cubicBezTo>
-                <a:cubicBezTo>
-                  <a:pt x="-36089" y="1061356"/>
-                  <a:pt x="30905" y="856233"/>
-                  <a:pt x="0" y="732200"/>
-                </a:cubicBezTo>
-                <a:cubicBezTo>
-                  <a:pt x="-30905" y="608167"/>
-                  <a:pt x="78716" y="259987"/>
+                  <a:pt x="11994232" y="204217"/>
+                  <a:pt x="11973009" y="404816"/>
+                  <a:pt x="11985553" y="512448"/>
+                </a:cubicBezTo>
+                <a:cubicBezTo>
+                  <a:pt x="11998097" y="620080"/>
+                  <a:pt x="11963651" y="828529"/>
+                  <a:pt x="11985553" y="967957"/>
+                </a:cubicBezTo>
+                <a:cubicBezTo>
+                  <a:pt x="12007455" y="1107385"/>
+                  <a:pt x="11916212" y="1365014"/>
+                  <a:pt x="11985553" y="1594282"/>
+                </a:cubicBezTo>
+                <a:cubicBezTo>
+                  <a:pt x="12054894" y="1823550"/>
+                  <a:pt x="11940088" y="1974879"/>
+                  <a:pt x="11985553" y="2277546"/>
+                </a:cubicBezTo>
+                <a:cubicBezTo>
+                  <a:pt x="12031018" y="2580213"/>
+                  <a:pt x="11919244" y="2683033"/>
+                  <a:pt x="11985553" y="2903872"/>
+                </a:cubicBezTo>
+                <a:cubicBezTo>
+                  <a:pt x="12051862" y="3124711"/>
+                  <a:pt x="11981773" y="3334554"/>
+                  <a:pt x="11985553" y="3473258"/>
+                </a:cubicBezTo>
+                <a:cubicBezTo>
+                  <a:pt x="11989333" y="3611962"/>
+                  <a:pt x="11958797" y="3776955"/>
+                  <a:pt x="11985553" y="3985706"/>
+                </a:cubicBezTo>
+                <a:cubicBezTo>
+                  <a:pt x="12012309" y="4194457"/>
+                  <a:pt x="11936413" y="4299504"/>
+                  <a:pt x="11985553" y="4498154"/>
+                </a:cubicBezTo>
+                <a:cubicBezTo>
+                  <a:pt x="12034693" y="4696804"/>
+                  <a:pt x="11983994" y="4764081"/>
+                  <a:pt x="11985553" y="4953663"/>
+                </a:cubicBezTo>
+                <a:cubicBezTo>
+                  <a:pt x="11987112" y="5143245"/>
+                  <a:pt x="11946505" y="5434776"/>
+                  <a:pt x="11985553" y="5693866"/>
+                </a:cubicBezTo>
+                <a:cubicBezTo>
+                  <a:pt x="11835731" y="5697393"/>
+                  <a:pt x="11740831" y="5650084"/>
+                  <a:pt x="11506131" y="5693866"/>
+                </a:cubicBezTo>
+                <a:cubicBezTo>
+                  <a:pt x="11271431" y="5737648"/>
+                  <a:pt x="11112384" y="5674428"/>
+                  <a:pt x="10906853" y="5693866"/>
+                </a:cubicBezTo>
+                <a:cubicBezTo>
+                  <a:pt x="10701322" y="5713304"/>
+                  <a:pt x="10560933" y="5664598"/>
+                  <a:pt x="10427431" y="5693866"/>
+                </a:cubicBezTo>
+                <a:cubicBezTo>
+                  <a:pt x="10293929" y="5723134"/>
+                  <a:pt x="10038985" y="5664743"/>
+                  <a:pt x="9708298" y="5693866"/>
+                </a:cubicBezTo>
+                <a:cubicBezTo>
+                  <a:pt x="9377611" y="5722989"/>
+                  <a:pt x="9038438" y="5670827"/>
+                  <a:pt x="8869309" y="5693866"/>
+                </a:cubicBezTo>
+                <a:cubicBezTo>
+                  <a:pt x="8700180" y="5716905"/>
+                  <a:pt x="8507128" y="5630253"/>
+                  <a:pt x="8270032" y="5693866"/>
+                </a:cubicBezTo>
+                <a:cubicBezTo>
+                  <a:pt x="8032936" y="5757479"/>
+                  <a:pt x="8017627" y="5652620"/>
+                  <a:pt x="7790609" y="5693866"/>
+                </a:cubicBezTo>
+                <a:cubicBezTo>
+                  <a:pt x="7563591" y="5735112"/>
+                  <a:pt x="7345637" y="5690191"/>
+                  <a:pt x="7191332" y="5693866"/>
+                </a:cubicBezTo>
+                <a:cubicBezTo>
+                  <a:pt x="7037027" y="5697541"/>
+                  <a:pt x="6732570" y="5663009"/>
+                  <a:pt x="6352343" y="5693866"/>
+                </a:cubicBezTo>
+                <a:cubicBezTo>
+                  <a:pt x="5972116" y="5724723"/>
+                  <a:pt x="6207235" y="5666736"/>
+                  <a:pt x="6112632" y="5693866"/>
+                </a:cubicBezTo>
+                <a:cubicBezTo>
+                  <a:pt x="6018029" y="5720996"/>
+                  <a:pt x="5806001" y="5663695"/>
+                  <a:pt x="5633210" y="5693866"/>
+                </a:cubicBezTo>
+                <a:cubicBezTo>
+                  <a:pt x="5460419" y="5724037"/>
+                  <a:pt x="5180704" y="5642534"/>
+                  <a:pt x="5033932" y="5693866"/>
+                </a:cubicBezTo>
+                <a:cubicBezTo>
+                  <a:pt x="4887160" y="5745198"/>
+                  <a:pt x="4536726" y="5622932"/>
+                  <a:pt x="4194944" y="5693866"/>
+                </a:cubicBezTo>
+                <a:cubicBezTo>
+                  <a:pt x="3853162" y="5764800"/>
+                  <a:pt x="3884934" y="5658196"/>
+                  <a:pt x="3595666" y="5693866"/>
+                </a:cubicBezTo>
+                <a:cubicBezTo>
+                  <a:pt x="3306398" y="5729536"/>
+                  <a:pt x="3302325" y="5652525"/>
+                  <a:pt x="3116244" y="5693866"/>
+                </a:cubicBezTo>
+                <a:cubicBezTo>
+                  <a:pt x="2930163" y="5735207"/>
+                  <a:pt x="2822065" y="5665197"/>
+                  <a:pt x="2636822" y="5693866"/>
+                </a:cubicBezTo>
+                <a:cubicBezTo>
+                  <a:pt x="2451579" y="5722535"/>
+                  <a:pt x="2225446" y="5664177"/>
+                  <a:pt x="1917688" y="5693866"/>
+                </a:cubicBezTo>
+                <a:cubicBezTo>
+                  <a:pt x="1609930" y="5723555"/>
+                  <a:pt x="1667508" y="5681217"/>
+                  <a:pt x="1558122" y="5693866"/>
+                </a:cubicBezTo>
+                <a:cubicBezTo>
+                  <a:pt x="1448736" y="5706515"/>
+                  <a:pt x="1096321" y="5645106"/>
+                  <a:pt x="958844" y="5693866"/>
+                </a:cubicBezTo>
+                <a:cubicBezTo>
+                  <a:pt x="821367" y="5742626"/>
+                  <a:pt x="375054" y="5580210"/>
+                  <a:pt x="0" y="5693866"/>
+                </a:cubicBezTo>
+                <a:cubicBezTo>
+                  <a:pt x="-24643" y="5524530"/>
+                  <a:pt x="3612" y="5397740"/>
+                  <a:pt x="0" y="5295295"/>
+                </a:cubicBezTo>
+                <a:cubicBezTo>
+                  <a:pt x="-3612" y="5192850"/>
+                  <a:pt x="55025" y="4958356"/>
+                  <a:pt x="0" y="4668970"/>
+                </a:cubicBezTo>
+                <a:cubicBezTo>
+                  <a:pt x="-55025" y="4379584"/>
+                  <a:pt x="15137" y="4247240"/>
+                  <a:pt x="0" y="3985706"/>
+                </a:cubicBezTo>
+                <a:cubicBezTo>
+                  <a:pt x="-15137" y="3724172"/>
+                  <a:pt x="39046" y="3585125"/>
+                  <a:pt x="0" y="3416320"/>
+                </a:cubicBezTo>
+                <a:cubicBezTo>
+                  <a:pt x="-39046" y="3247515"/>
+                  <a:pt x="29332" y="3078272"/>
+                  <a:pt x="0" y="2903872"/>
+                </a:cubicBezTo>
+                <a:cubicBezTo>
+                  <a:pt x="-29332" y="2729472"/>
+                  <a:pt x="2734" y="2495405"/>
+                  <a:pt x="0" y="2277546"/>
+                </a:cubicBezTo>
+                <a:cubicBezTo>
+                  <a:pt x="-2734" y="2059687"/>
+                  <a:pt x="38514" y="1854080"/>
+                  <a:pt x="0" y="1651221"/>
+                </a:cubicBezTo>
+                <a:cubicBezTo>
+                  <a:pt x="-38514" y="1448363"/>
+                  <a:pt x="30020" y="1392097"/>
+                  <a:pt x="0" y="1252651"/>
+                </a:cubicBezTo>
+                <a:cubicBezTo>
+                  <a:pt x="-30020" y="1113205"/>
+                  <a:pt x="44468" y="915113"/>
+                  <a:pt x="0" y="740203"/>
+                </a:cubicBezTo>
+                <a:cubicBezTo>
+                  <a:pt x="-44468" y="565293"/>
+                  <a:pt x="20710" y="351820"/>
                   <a:pt x="0" y="0"/>
                 </a:cubicBezTo>
                 <a:close/>
@@ -4001,14 +4001,10 @@
           <a:p>
             <a:pPr algn="ctr"/>
             <a:r>
-              <a:rPr lang="en-US" sz="4000" b="1" dirty="0">
-                <a:solidFill>
-                  <a:srgbClr val="6971E0"/>
-                </a:solidFill>
-              </a:rPr>
+              <a:rPr lang="en-US" sz="4400" b="1" dirty="0"/>
               <a:t>Instructions</a:t>
             </a:r>
-            <a:endParaRPr lang="en-US" sz="4000" dirty="0"/>
+            <a:endParaRPr lang="en-US" sz="4400" dirty="0"/>
           </a:p>
           <a:p>
             <a:pPr marL="685800" indent="-685800">
@@ -4017,7 +4013,7 @@
             </a:pPr>
             <a:r>
               <a:rPr lang="en-US" sz="4000" dirty="0"/>
-              <a:t>To view the desired lab  presentation, simply click on the appropriate cloud🤗</a:t>
+              <a:t>To view the desired lab  presentation, simply click on the appropriate cloud</a:t>
             </a:r>
           </a:p>
           <a:p>
@@ -4047,7 +4043,7 @@
             </a:r>
             <a:r>
               <a:rPr lang="en-US" sz="4000" b="1" dirty="0"/>
-              <a:t>ESC/F11</a:t>
+              <a:t>ESC</a:t>
             </a:r>
             <a:r>
               <a:rPr lang="en-US" sz="4000" dirty="0"/>
@@ -5597,22 +5593,22 @@
         </p:nvSpPr>
         <p:spPr>
           <a:xfrm>
-            <a:off x="21758882" y="7016817"/>
-            <a:ext cx="5846618" cy="3214255"/>
+            <a:off x="21214581" y="8086323"/>
+            <a:ext cx="5846618" cy="3574164"/>
           </a:xfrm>
           <a:custGeom>
             <a:avLst/>
             <a:gdLst>
               <a:gd name="connsiteX0" fmla="*/ 0 w 5846618"/>
-              <a:gd name="connsiteY0" fmla="*/ 1607128 h 3214255"/>
+              <a:gd name="connsiteY0" fmla="*/ 1787082 h 3574164"/>
               <a:gd name="connsiteX1" fmla="*/ 2923309 w 5846618"/>
-              <a:gd name="connsiteY1" fmla="*/ 0 h 3214255"/>
+              <a:gd name="connsiteY1" fmla="*/ 0 h 3574164"/>
               <a:gd name="connsiteX2" fmla="*/ 5846618 w 5846618"/>
-              <a:gd name="connsiteY2" fmla="*/ 1607128 h 3214255"/>
+              <a:gd name="connsiteY2" fmla="*/ 1787082 h 3574164"/>
               <a:gd name="connsiteX3" fmla="*/ 2923309 w 5846618"/>
-              <a:gd name="connsiteY3" fmla="*/ 3214256 h 3214255"/>
+              <a:gd name="connsiteY3" fmla="*/ 3574164 h 3574164"/>
               <a:gd name="connsiteX4" fmla="*/ 0 w 5846618"/>
-              <a:gd name="connsiteY4" fmla="*/ 1607128 h 3214255"/>
+              <a:gd name="connsiteY4" fmla="*/ 1787082 h 3574164"/>
             </a:gdLst>
             <a:ahLst/>
             <a:cxnLst>
@@ -5634,55 +5630,55 @@
             </a:cxnLst>
             <a:rect l="l" t="t" r="r" b="b"/>
             <a:pathLst>
-              <a:path w="5846618" h="3214255" fill="none" extrusionOk="0">
+              <a:path w="5846618" h="3574164" fill="none" extrusionOk="0">
                 <a:moveTo>
-                  <a:pt x="0" y="1607128"/>
+                  <a:pt x="0" y="1787082"/>
                 </a:moveTo>
                 <a:cubicBezTo>
-                  <a:pt x="139289" y="736060"/>
-                  <a:pt x="1337145" y="-58313"/>
+                  <a:pt x="194674" y="823198"/>
+                  <a:pt x="1357649" y="-100509"/>
                   <a:pt x="2923309" y="0"/>
                 </a:cubicBezTo>
                 <a:cubicBezTo>
-                  <a:pt x="4503451" y="-5261"/>
-                  <a:pt x="5776218" y="785817"/>
-                  <a:pt x="5846618" y="1607128"/>
-                </a:cubicBezTo>
-                <a:cubicBezTo>
-                  <a:pt x="5836116" y="2394572"/>
-                  <a:pt x="4511898" y="3250264"/>
-                  <a:pt x="2923309" y="3214256"/>
-                </a:cubicBezTo>
-                <a:cubicBezTo>
-                  <a:pt x="1455275" y="3296253"/>
-                  <a:pt x="146989" y="2530062"/>
-                  <a:pt x="0" y="1607128"/>
+                  <a:pt x="4398090" y="-21396"/>
+                  <a:pt x="5743814" y="896893"/>
+                  <a:pt x="5846618" y="1787082"/>
+                </a:cubicBezTo>
+                <a:cubicBezTo>
+                  <a:pt x="5839134" y="2702691"/>
+                  <a:pt x="4504430" y="3620549"/>
+                  <a:pt x="2923309" y="3574164"/>
+                </a:cubicBezTo>
+                <a:cubicBezTo>
+                  <a:pt x="1336964" y="3589926"/>
+                  <a:pt x="46004" y="2785121"/>
+                  <a:pt x="0" y="1787082"/>
                 </a:cubicBezTo>
                 <a:close/>
               </a:path>
-              <a:path w="5846618" h="3214255" stroke="0" extrusionOk="0">
+              <a:path w="5846618" h="3574164" stroke="0" extrusionOk="0">
                 <a:moveTo>
-                  <a:pt x="0" y="1607128"/>
+                  <a:pt x="0" y="1787082"/>
                 </a:moveTo>
                 <a:cubicBezTo>
-                  <a:pt x="-128245" y="640432"/>
-                  <a:pt x="1076873" y="87050"/>
+                  <a:pt x="-96155" y="740794"/>
+                  <a:pt x="1029000" y="105017"/>
                   <a:pt x="2923309" y="0"/>
                 </a:cubicBezTo>
                 <a:cubicBezTo>
-                  <a:pt x="4697193" y="33554"/>
-                  <a:pt x="5672147" y="725084"/>
-                  <a:pt x="5846618" y="1607128"/>
-                </a:cubicBezTo>
-                <a:cubicBezTo>
-                  <a:pt x="5806019" y="2534367"/>
-                  <a:pt x="4497039" y="3439597"/>
-                  <a:pt x="2923309" y="3214256"/>
-                </a:cubicBezTo>
-                <a:cubicBezTo>
-                  <a:pt x="1198082" y="3153674"/>
-                  <a:pt x="47666" y="2517495"/>
-                  <a:pt x="0" y="1607128"/>
+                  <a:pt x="4655676" y="24814"/>
+                  <a:pt x="5757145" y="802949"/>
+                  <a:pt x="5846618" y="1787082"/>
+                </a:cubicBezTo>
+                <a:cubicBezTo>
+                  <a:pt x="5747846" y="2870516"/>
+                  <a:pt x="4533990" y="3595269"/>
+                  <a:pt x="2923309" y="3574164"/>
+                </a:cubicBezTo>
+                <a:cubicBezTo>
+                  <a:pt x="1244944" y="3539221"/>
+                  <a:pt x="129270" y="2835826"/>
+                  <a:pt x="0" y="1787082"/>
                 </a:cubicBezTo>
                 <a:close/>
               </a:path>
@@ -7552,8 +7548,8 @@
         </p:nvCxnSpPr>
         <p:spPr>
           <a:xfrm>
-            <a:off x="24682191" y="10231072"/>
-            <a:ext cx="0" cy="8130760"/>
+            <a:off x="24137890" y="11660487"/>
+            <a:ext cx="0" cy="7060650"/>
           </a:xfrm>
           <a:prstGeom prst="line">
             <a:avLst/>
@@ -8123,6 +8119,870 @@
           </a:fontRef>
         </p:style>
       </p:cxnSp>
+      <p:sp>
+        <p:nvSpPr>
+          <p:cNvPr id="8" name="TextBox 7">
+            <a:extLst>
+              <a:ext uri="{FF2B5EF4-FFF2-40B4-BE49-F238E27FC236}">
+                <a16:creationId xmlns:a16="http://schemas.microsoft.com/office/drawing/2014/main" id="{E4A9CAD5-BFBE-EF2B-49BC-1F90460BB27C}"/>
+              </a:ext>
+            </a:extLst>
+          </p:cNvPr>
+          <p:cNvSpPr txBox="1"/>
+          <p:nvPr/>
+        </p:nvSpPr>
+        <p:spPr>
+          <a:xfrm>
+            <a:off x="16462361" y="3571777"/>
+            <a:ext cx="10369127" cy="2616101"/>
+          </a:xfrm>
+          <a:custGeom>
+            <a:avLst/>
+            <a:gdLst>
+              <a:gd name="connsiteX0" fmla="*/ 0 w 10369127"/>
+              <a:gd name="connsiteY0" fmla="*/ 0 h 2616101"/>
+              <a:gd name="connsiteX1" fmla="*/ 576063 w 10369127"/>
+              <a:gd name="connsiteY1" fmla="*/ 0 h 2616101"/>
+              <a:gd name="connsiteX2" fmla="*/ 944743 w 10369127"/>
+              <a:gd name="connsiteY2" fmla="*/ 0 h 2616101"/>
+              <a:gd name="connsiteX3" fmla="*/ 1417114 w 10369127"/>
+              <a:gd name="connsiteY3" fmla="*/ 0 h 2616101"/>
+              <a:gd name="connsiteX4" fmla="*/ 1993177 w 10369127"/>
+              <a:gd name="connsiteY4" fmla="*/ 0 h 2616101"/>
+              <a:gd name="connsiteX5" fmla="*/ 2361857 w 10369127"/>
+              <a:gd name="connsiteY5" fmla="*/ 0 h 2616101"/>
+              <a:gd name="connsiteX6" fmla="*/ 2834228 w 10369127"/>
+              <a:gd name="connsiteY6" fmla="*/ 0 h 2616101"/>
+              <a:gd name="connsiteX7" fmla="*/ 3410291 w 10369127"/>
+              <a:gd name="connsiteY7" fmla="*/ 0 h 2616101"/>
+              <a:gd name="connsiteX8" fmla="*/ 3778971 w 10369127"/>
+              <a:gd name="connsiteY8" fmla="*/ 0 h 2616101"/>
+              <a:gd name="connsiteX9" fmla="*/ 4458725 w 10369127"/>
+              <a:gd name="connsiteY9" fmla="*/ 0 h 2616101"/>
+              <a:gd name="connsiteX10" fmla="*/ 4827405 w 10369127"/>
+              <a:gd name="connsiteY10" fmla="*/ 0 h 2616101"/>
+              <a:gd name="connsiteX11" fmla="*/ 5092393 w 10369127"/>
+              <a:gd name="connsiteY11" fmla="*/ 0 h 2616101"/>
+              <a:gd name="connsiteX12" fmla="*/ 5772147 w 10369127"/>
+              <a:gd name="connsiteY12" fmla="*/ 0 h 2616101"/>
+              <a:gd name="connsiteX13" fmla="*/ 6037136 w 10369127"/>
+              <a:gd name="connsiteY13" fmla="*/ 0 h 2616101"/>
+              <a:gd name="connsiteX14" fmla="*/ 6509508 w 10369127"/>
+              <a:gd name="connsiteY14" fmla="*/ 0 h 2616101"/>
+              <a:gd name="connsiteX15" fmla="*/ 7189261 w 10369127"/>
+              <a:gd name="connsiteY15" fmla="*/ 0 h 2616101"/>
+              <a:gd name="connsiteX16" fmla="*/ 7869015 w 10369127"/>
+              <a:gd name="connsiteY16" fmla="*/ 0 h 2616101"/>
+              <a:gd name="connsiteX17" fmla="*/ 8341387 w 10369127"/>
+              <a:gd name="connsiteY17" fmla="*/ 0 h 2616101"/>
+              <a:gd name="connsiteX18" fmla="*/ 8606375 w 10369127"/>
+              <a:gd name="connsiteY18" fmla="*/ 0 h 2616101"/>
+              <a:gd name="connsiteX19" fmla="*/ 8975055 w 10369127"/>
+              <a:gd name="connsiteY19" fmla="*/ 0 h 2616101"/>
+              <a:gd name="connsiteX20" fmla="*/ 9654809 w 10369127"/>
+              <a:gd name="connsiteY20" fmla="*/ 0 h 2616101"/>
+              <a:gd name="connsiteX21" fmla="*/ 10369127 w 10369127"/>
+              <a:gd name="connsiteY21" fmla="*/ 0 h 2616101"/>
+              <a:gd name="connsiteX22" fmla="*/ 10369127 w 10369127"/>
+              <a:gd name="connsiteY22" fmla="*/ 497059 h 2616101"/>
+              <a:gd name="connsiteX23" fmla="*/ 10369127 w 10369127"/>
+              <a:gd name="connsiteY23" fmla="*/ 994118 h 2616101"/>
+              <a:gd name="connsiteX24" fmla="*/ 10369127 w 10369127"/>
+              <a:gd name="connsiteY24" fmla="*/ 1491178 h 2616101"/>
+              <a:gd name="connsiteX25" fmla="*/ 10369127 w 10369127"/>
+              <a:gd name="connsiteY25" fmla="*/ 1988237 h 2616101"/>
+              <a:gd name="connsiteX26" fmla="*/ 10369127 w 10369127"/>
+              <a:gd name="connsiteY26" fmla="*/ 2616101 h 2616101"/>
+              <a:gd name="connsiteX27" fmla="*/ 10104138 w 10369127"/>
+              <a:gd name="connsiteY27" fmla="*/ 2616101 h 2616101"/>
+              <a:gd name="connsiteX28" fmla="*/ 9735458 w 10369127"/>
+              <a:gd name="connsiteY28" fmla="*/ 2616101 h 2616101"/>
+              <a:gd name="connsiteX29" fmla="*/ 9366778 w 10369127"/>
+              <a:gd name="connsiteY29" fmla="*/ 2616101 h 2616101"/>
+              <a:gd name="connsiteX30" fmla="*/ 8790715 w 10369127"/>
+              <a:gd name="connsiteY30" fmla="*/ 2616101 h 2616101"/>
+              <a:gd name="connsiteX31" fmla="*/ 8525727 w 10369127"/>
+              <a:gd name="connsiteY31" fmla="*/ 2616101 h 2616101"/>
+              <a:gd name="connsiteX32" fmla="*/ 8053355 w 10369127"/>
+              <a:gd name="connsiteY32" fmla="*/ 2616101 h 2616101"/>
+              <a:gd name="connsiteX33" fmla="*/ 7788367 w 10369127"/>
+              <a:gd name="connsiteY33" fmla="*/ 2616101 h 2616101"/>
+              <a:gd name="connsiteX34" fmla="*/ 7108613 w 10369127"/>
+              <a:gd name="connsiteY34" fmla="*/ 2616101 h 2616101"/>
+              <a:gd name="connsiteX35" fmla="*/ 6428859 w 10369127"/>
+              <a:gd name="connsiteY35" fmla="*/ 2616101 h 2616101"/>
+              <a:gd name="connsiteX36" fmla="*/ 5852796 w 10369127"/>
+              <a:gd name="connsiteY36" fmla="*/ 2616101 h 2616101"/>
+              <a:gd name="connsiteX37" fmla="*/ 5380425 w 10369127"/>
+              <a:gd name="connsiteY37" fmla="*/ 2616101 h 2616101"/>
+              <a:gd name="connsiteX38" fmla="*/ 4804362 w 10369127"/>
+              <a:gd name="connsiteY38" fmla="*/ 2616101 h 2616101"/>
+              <a:gd name="connsiteX39" fmla="*/ 4124608 w 10369127"/>
+              <a:gd name="connsiteY39" fmla="*/ 2616101 h 2616101"/>
+              <a:gd name="connsiteX40" fmla="*/ 3755928 w 10369127"/>
+              <a:gd name="connsiteY40" fmla="*/ 2616101 h 2616101"/>
+              <a:gd name="connsiteX41" fmla="*/ 3283557 w 10369127"/>
+              <a:gd name="connsiteY41" fmla="*/ 2616101 h 2616101"/>
+              <a:gd name="connsiteX42" fmla="*/ 2500112 w 10369127"/>
+              <a:gd name="connsiteY42" fmla="*/ 2616101 h 2616101"/>
+              <a:gd name="connsiteX43" fmla="*/ 2131432 w 10369127"/>
+              <a:gd name="connsiteY43" fmla="*/ 2616101 h 2616101"/>
+              <a:gd name="connsiteX44" fmla="*/ 1347987 w 10369127"/>
+              <a:gd name="connsiteY44" fmla="*/ 2616101 h 2616101"/>
+              <a:gd name="connsiteX45" fmla="*/ 668233 w 10369127"/>
+              <a:gd name="connsiteY45" fmla="*/ 2616101 h 2616101"/>
+              <a:gd name="connsiteX46" fmla="*/ 0 w 10369127"/>
+              <a:gd name="connsiteY46" fmla="*/ 2616101 h 2616101"/>
+              <a:gd name="connsiteX47" fmla="*/ 0 w 10369127"/>
+              <a:gd name="connsiteY47" fmla="*/ 2171364 h 2616101"/>
+              <a:gd name="connsiteX48" fmla="*/ 0 w 10369127"/>
+              <a:gd name="connsiteY48" fmla="*/ 1726627 h 2616101"/>
+              <a:gd name="connsiteX49" fmla="*/ 0 w 10369127"/>
+              <a:gd name="connsiteY49" fmla="*/ 1281889 h 2616101"/>
+              <a:gd name="connsiteX50" fmla="*/ 0 w 10369127"/>
+              <a:gd name="connsiteY50" fmla="*/ 758669 h 2616101"/>
+              <a:gd name="connsiteX51" fmla="*/ 0 w 10369127"/>
+              <a:gd name="connsiteY51" fmla="*/ 0 h 2616101"/>
+            </a:gdLst>
+            <a:ahLst/>
+            <a:cxnLst>
+              <a:cxn ang="0">
+                <a:pos x="connsiteX0" y="connsiteY0"/>
+              </a:cxn>
+              <a:cxn ang="0">
+                <a:pos x="connsiteX1" y="connsiteY1"/>
+              </a:cxn>
+              <a:cxn ang="0">
+                <a:pos x="connsiteX2" y="connsiteY2"/>
+              </a:cxn>
+              <a:cxn ang="0">
+                <a:pos x="connsiteX3" y="connsiteY3"/>
+              </a:cxn>
+              <a:cxn ang="0">
+                <a:pos x="connsiteX4" y="connsiteY4"/>
+              </a:cxn>
+              <a:cxn ang="0">
+                <a:pos x="connsiteX5" y="connsiteY5"/>
+              </a:cxn>
+              <a:cxn ang="0">
+                <a:pos x="connsiteX6" y="connsiteY6"/>
+              </a:cxn>
+              <a:cxn ang="0">
+                <a:pos x="connsiteX7" y="connsiteY7"/>
+              </a:cxn>
+              <a:cxn ang="0">
+                <a:pos x="connsiteX8" y="connsiteY8"/>
+              </a:cxn>
+              <a:cxn ang="0">
+                <a:pos x="connsiteX9" y="connsiteY9"/>
+              </a:cxn>
+              <a:cxn ang="0">
+                <a:pos x="connsiteX10" y="connsiteY10"/>
+              </a:cxn>
+              <a:cxn ang="0">
+                <a:pos x="connsiteX11" y="connsiteY11"/>
+              </a:cxn>
+              <a:cxn ang="0">
+                <a:pos x="connsiteX12" y="connsiteY12"/>
+              </a:cxn>
+              <a:cxn ang="0">
+                <a:pos x="connsiteX13" y="connsiteY13"/>
+              </a:cxn>
+              <a:cxn ang="0">
+                <a:pos x="connsiteX14" y="connsiteY14"/>
+              </a:cxn>
+              <a:cxn ang="0">
+                <a:pos x="connsiteX15" y="connsiteY15"/>
+              </a:cxn>
+              <a:cxn ang="0">
+                <a:pos x="connsiteX16" y="connsiteY16"/>
+              </a:cxn>
+              <a:cxn ang="0">
+                <a:pos x="connsiteX17" y="connsiteY17"/>
+              </a:cxn>
+              <a:cxn ang="0">
+                <a:pos x="connsiteX18" y="connsiteY18"/>
+              </a:cxn>
+              <a:cxn ang="0">
+                <a:pos x="connsiteX19" y="connsiteY19"/>
+              </a:cxn>
+              <a:cxn ang="0">
+                <a:pos x="connsiteX20" y="connsiteY20"/>
+              </a:cxn>
+              <a:cxn ang="0">
+                <a:pos x="connsiteX21" y="connsiteY21"/>
+              </a:cxn>
+              <a:cxn ang="0">
+                <a:pos x="connsiteX22" y="connsiteY22"/>
+              </a:cxn>
+              <a:cxn ang="0">
+                <a:pos x="connsiteX23" y="connsiteY23"/>
+              </a:cxn>
+              <a:cxn ang="0">
+                <a:pos x="connsiteX24" y="connsiteY24"/>
+              </a:cxn>
+              <a:cxn ang="0">
+                <a:pos x="connsiteX25" y="connsiteY25"/>
+              </a:cxn>
+              <a:cxn ang="0">
+                <a:pos x="connsiteX26" y="connsiteY26"/>
+              </a:cxn>
+              <a:cxn ang="0">
+                <a:pos x="connsiteX27" y="connsiteY27"/>
+              </a:cxn>
+              <a:cxn ang="0">
+                <a:pos x="connsiteX28" y="connsiteY28"/>
+              </a:cxn>
+              <a:cxn ang="0">
+                <a:pos x="connsiteX29" y="connsiteY29"/>
+              </a:cxn>
+              <a:cxn ang="0">
+                <a:pos x="connsiteX30" y="connsiteY30"/>
+              </a:cxn>
+              <a:cxn ang="0">
+                <a:pos x="connsiteX31" y="connsiteY31"/>
+              </a:cxn>
+              <a:cxn ang="0">
+                <a:pos x="connsiteX32" y="connsiteY32"/>
+              </a:cxn>
+              <a:cxn ang="0">
+                <a:pos x="connsiteX33" y="connsiteY33"/>
+              </a:cxn>
+              <a:cxn ang="0">
+                <a:pos x="connsiteX34" y="connsiteY34"/>
+              </a:cxn>
+              <a:cxn ang="0">
+                <a:pos x="connsiteX35" y="connsiteY35"/>
+              </a:cxn>
+              <a:cxn ang="0">
+                <a:pos x="connsiteX36" y="connsiteY36"/>
+              </a:cxn>
+              <a:cxn ang="0">
+                <a:pos x="connsiteX37" y="connsiteY37"/>
+              </a:cxn>
+              <a:cxn ang="0">
+                <a:pos x="connsiteX38" y="connsiteY38"/>
+              </a:cxn>
+              <a:cxn ang="0">
+                <a:pos x="connsiteX39" y="connsiteY39"/>
+              </a:cxn>
+              <a:cxn ang="0">
+                <a:pos x="connsiteX40" y="connsiteY40"/>
+              </a:cxn>
+              <a:cxn ang="0">
+                <a:pos x="connsiteX41" y="connsiteY41"/>
+              </a:cxn>
+              <a:cxn ang="0">
+                <a:pos x="connsiteX42" y="connsiteY42"/>
+              </a:cxn>
+              <a:cxn ang="0">
+                <a:pos x="connsiteX43" y="connsiteY43"/>
+              </a:cxn>
+              <a:cxn ang="0">
+                <a:pos x="connsiteX44" y="connsiteY44"/>
+              </a:cxn>
+              <a:cxn ang="0">
+                <a:pos x="connsiteX45" y="connsiteY45"/>
+              </a:cxn>
+              <a:cxn ang="0">
+                <a:pos x="connsiteX46" y="connsiteY46"/>
+              </a:cxn>
+              <a:cxn ang="0">
+                <a:pos x="connsiteX47" y="connsiteY47"/>
+              </a:cxn>
+              <a:cxn ang="0">
+                <a:pos x="connsiteX48" y="connsiteY48"/>
+              </a:cxn>
+              <a:cxn ang="0">
+                <a:pos x="connsiteX49" y="connsiteY49"/>
+              </a:cxn>
+              <a:cxn ang="0">
+                <a:pos x="connsiteX50" y="connsiteY50"/>
+              </a:cxn>
+              <a:cxn ang="0">
+                <a:pos x="connsiteX51" y="connsiteY51"/>
+              </a:cxn>
+            </a:cxnLst>
+            <a:rect l="l" t="t" r="r" b="b"/>
+            <a:pathLst>
+              <a:path w="10369127" h="2616101" fill="none" extrusionOk="0">
+                <a:moveTo>
+                  <a:pt x="0" y="0"/>
+                </a:moveTo>
+                <a:cubicBezTo>
+                  <a:pt x="166654" y="-67038"/>
+                  <a:pt x="310712" y="65958"/>
+                  <a:pt x="576063" y="0"/>
+                </a:cubicBezTo>
+                <a:cubicBezTo>
+                  <a:pt x="841414" y="-65958"/>
+                  <a:pt x="814150" y="7387"/>
+                  <a:pt x="944743" y="0"/>
+                </a:cubicBezTo>
+                <a:cubicBezTo>
+                  <a:pt x="1075336" y="-7387"/>
+                  <a:pt x="1317292" y="26597"/>
+                  <a:pt x="1417114" y="0"/>
+                </a:cubicBezTo>
+                <a:cubicBezTo>
+                  <a:pt x="1516936" y="-26597"/>
+                  <a:pt x="1737023" y="58919"/>
+                  <a:pt x="1993177" y="0"/>
+                </a:cubicBezTo>
+                <a:cubicBezTo>
+                  <a:pt x="2249331" y="-58919"/>
+                  <a:pt x="2198627" y="1736"/>
+                  <a:pt x="2361857" y="0"/>
+                </a:cubicBezTo>
+                <a:cubicBezTo>
+                  <a:pt x="2525087" y="-1736"/>
+                  <a:pt x="2687994" y="15713"/>
+                  <a:pt x="2834228" y="0"/>
+                </a:cubicBezTo>
+                <a:cubicBezTo>
+                  <a:pt x="2980462" y="-15713"/>
+                  <a:pt x="3196113" y="67671"/>
+                  <a:pt x="3410291" y="0"/>
+                </a:cubicBezTo>
+                <a:cubicBezTo>
+                  <a:pt x="3624469" y="-67671"/>
+                  <a:pt x="3655865" y="32473"/>
+                  <a:pt x="3778971" y="0"/>
+                </a:cubicBezTo>
+                <a:cubicBezTo>
+                  <a:pt x="3902077" y="-32473"/>
+                  <a:pt x="4238553" y="51084"/>
+                  <a:pt x="4458725" y="0"/>
+                </a:cubicBezTo>
+                <a:cubicBezTo>
+                  <a:pt x="4678897" y="-51084"/>
+                  <a:pt x="4664572" y="33380"/>
+                  <a:pt x="4827405" y="0"/>
+                </a:cubicBezTo>
+                <a:cubicBezTo>
+                  <a:pt x="4990238" y="-33380"/>
+                  <a:pt x="4998473" y="23712"/>
+                  <a:pt x="5092393" y="0"/>
+                </a:cubicBezTo>
+                <a:cubicBezTo>
+                  <a:pt x="5186313" y="-23712"/>
+                  <a:pt x="5475199" y="19713"/>
+                  <a:pt x="5772147" y="0"/>
+                </a:cubicBezTo>
+                <a:cubicBezTo>
+                  <a:pt x="6069095" y="-19713"/>
+                  <a:pt x="5922250" y="3671"/>
+                  <a:pt x="6037136" y="0"/>
+                </a:cubicBezTo>
+                <a:cubicBezTo>
+                  <a:pt x="6152022" y="-3671"/>
+                  <a:pt x="6408423" y="50226"/>
+                  <a:pt x="6509508" y="0"/>
+                </a:cubicBezTo>
+                <a:cubicBezTo>
+                  <a:pt x="6610593" y="-50226"/>
+                  <a:pt x="6885003" y="21432"/>
+                  <a:pt x="7189261" y="0"/>
+                </a:cubicBezTo>
+                <a:cubicBezTo>
+                  <a:pt x="7493519" y="-21432"/>
+                  <a:pt x="7730360" y="18423"/>
+                  <a:pt x="7869015" y="0"/>
+                </a:cubicBezTo>
+                <a:cubicBezTo>
+                  <a:pt x="8007670" y="-18423"/>
+                  <a:pt x="8120831" y="9294"/>
+                  <a:pt x="8341387" y="0"/>
+                </a:cubicBezTo>
+                <a:cubicBezTo>
+                  <a:pt x="8561943" y="-9294"/>
+                  <a:pt x="8523524" y="10959"/>
+                  <a:pt x="8606375" y="0"/>
+                </a:cubicBezTo>
+                <a:cubicBezTo>
+                  <a:pt x="8689226" y="-10959"/>
+                  <a:pt x="8861842" y="38651"/>
+                  <a:pt x="8975055" y="0"/>
+                </a:cubicBezTo>
+                <a:cubicBezTo>
+                  <a:pt x="9088268" y="-38651"/>
+                  <a:pt x="9376974" y="34262"/>
+                  <a:pt x="9654809" y="0"/>
+                </a:cubicBezTo>
+                <a:cubicBezTo>
+                  <a:pt x="9932644" y="-34262"/>
+                  <a:pt x="10167802" y="35736"/>
+                  <a:pt x="10369127" y="0"/>
+                </a:cubicBezTo>
+                <a:cubicBezTo>
+                  <a:pt x="10418087" y="179116"/>
+                  <a:pt x="10340587" y="393792"/>
+                  <a:pt x="10369127" y="497059"/>
+                </a:cubicBezTo>
+                <a:cubicBezTo>
+                  <a:pt x="10397667" y="600326"/>
+                  <a:pt x="10312396" y="819322"/>
+                  <a:pt x="10369127" y="994118"/>
+                </a:cubicBezTo>
+                <a:cubicBezTo>
+                  <a:pt x="10425858" y="1168914"/>
+                  <a:pt x="10347194" y="1326142"/>
+                  <a:pt x="10369127" y="1491178"/>
+                </a:cubicBezTo>
+                <a:cubicBezTo>
+                  <a:pt x="10391060" y="1656214"/>
+                  <a:pt x="10339835" y="1746329"/>
+                  <a:pt x="10369127" y="1988237"/>
+                </a:cubicBezTo>
+                <a:cubicBezTo>
+                  <a:pt x="10398419" y="2230145"/>
+                  <a:pt x="10352348" y="2421884"/>
+                  <a:pt x="10369127" y="2616101"/>
+                </a:cubicBezTo>
+                <a:cubicBezTo>
+                  <a:pt x="10278688" y="2622390"/>
+                  <a:pt x="10215676" y="2607444"/>
+                  <a:pt x="10104138" y="2616101"/>
+                </a:cubicBezTo>
+                <a:cubicBezTo>
+                  <a:pt x="9992600" y="2624758"/>
+                  <a:pt x="9843989" y="2596291"/>
+                  <a:pt x="9735458" y="2616101"/>
+                </a:cubicBezTo>
+                <a:cubicBezTo>
+                  <a:pt x="9626927" y="2635911"/>
+                  <a:pt x="9458457" y="2584898"/>
+                  <a:pt x="9366778" y="2616101"/>
+                </a:cubicBezTo>
+                <a:cubicBezTo>
+                  <a:pt x="9275099" y="2647304"/>
+                  <a:pt x="8930340" y="2593171"/>
+                  <a:pt x="8790715" y="2616101"/>
+                </a:cubicBezTo>
+                <a:cubicBezTo>
+                  <a:pt x="8651090" y="2639031"/>
+                  <a:pt x="8632266" y="2614342"/>
+                  <a:pt x="8525727" y="2616101"/>
+                </a:cubicBezTo>
+                <a:cubicBezTo>
+                  <a:pt x="8419188" y="2617860"/>
+                  <a:pt x="8218506" y="2612664"/>
+                  <a:pt x="8053355" y="2616101"/>
+                </a:cubicBezTo>
+                <a:cubicBezTo>
+                  <a:pt x="7888204" y="2619538"/>
+                  <a:pt x="7871496" y="2585868"/>
+                  <a:pt x="7788367" y="2616101"/>
+                </a:cubicBezTo>
+                <a:cubicBezTo>
+                  <a:pt x="7705238" y="2646334"/>
+                  <a:pt x="7288969" y="2574797"/>
+                  <a:pt x="7108613" y="2616101"/>
+                </a:cubicBezTo>
+                <a:cubicBezTo>
+                  <a:pt x="6928257" y="2657405"/>
+                  <a:pt x="6679715" y="2599691"/>
+                  <a:pt x="6428859" y="2616101"/>
+                </a:cubicBezTo>
+                <a:cubicBezTo>
+                  <a:pt x="6178003" y="2632511"/>
+                  <a:pt x="6018517" y="2594187"/>
+                  <a:pt x="5852796" y="2616101"/>
+                </a:cubicBezTo>
+                <a:cubicBezTo>
+                  <a:pt x="5687075" y="2638015"/>
+                  <a:pt x="5497204" y="2606835"/>
+                  <a:pt x="5380425" y="2616101"/>
+                </a:cubicBezTo>
+                <a:cubicBezTo>
+                  <a:pt x="5263646" y="2625367"/>
+                  <a:pt x="4920517" y="2567488"/>
+                  <a:pt x="4804362" y="2616101"/>
+                </a:cubicBezTo>
+                <a:cubicBezTo>
+                  <a:pt x="4688207" y="2664714"/>
+                  <a:pt x="4425047" y="2569988"/>
+                  <a:pt x="4124608" y="2616101"/>
+                </a:cubicBezTo>
+                <a:cubicBezTo>
+                  <a:pt x="3824169" y="2662214"/>
+                  <a:pt x="3934064" y="2599347"/>
+                  <a:pt x="3755928" y="2616101"/>
+                </a:cubicBezTo>
+                <a:cubicBezTo>
+                  <a:pt x="3577792" y="2632855"/>
+                  <a:pt x="3510885" y="2573080"/>
+                  <a:pt x="3283557" y="2616101"/>
+                </a:cubicBezTo>
+                <a:cubicBezTo>
+                  <a:pt x="3056229" y="2659122"/>
+                  <a:pt x="2793178" y="2553340"/>
+                  <a:pt x="2500112" y="2616101"/>
+                </a:cubicBezTo>
+                <a:cubicBezTo>
+                  <a:pt x="2207046" y="2678862"/>
+                  <a:pt x="2308794" y="2582800"/>
+                  <a:pt x="2131432" y="2616101"/>
+                </a:cubicBezTo>
+                <a:cubicBezTo>
+                  <a:pt x="1954070" y="2649402"/>
+                  <a:pt x="1670550" y="2606655"/>
+                  <a:pt x="1347987" y="2616101"/>
+                </a:cubicBezTo>
+                <a:cubicBezTo>
+                  <a:pt x="1025424" y="2625547"/>
+                  <a:pt x="807086" y="2592857"/>
+                  <a:pt x="668233" y="2616101"/>
+                </a:cubicBezTo>
+                <a:cubicBezTo>
+                  <a:pt x="529380" y="2639345"/>
+                  <a:pt x="217167" y="2550095"/>
+                  <a:pt x="0" y="2616101"/>
+                </a:cubicBezTo>
+                <a:cubicBezTo>
+                  <a:pt x="-31269" y="2473155"/>
+                  <a:pt x="4066" y="2343149"/>
+                  <a:pt x="0" y="2171364"/>
+                </a:cubicBezTo>
+                <a:cubicBezTo>
+                  <a:pt x="-4066" y="1999579"/>
+                  <a:pt x="32873" y="1869406"/>
+                  <a:pt x="0" y="1726627"/>
+                </a:cubicBezTo>
+                <a:cubicBezTo>
+                  <a:pt x="-32873" y="1583848"/>
+                  <a:pt x="8849" y="1445163"/>
+                  <a:pt x="0" y="1281889"/>
+                </a:cubicBezTo>
+                <a:cubicBezTo>
+                  <a:pt x="-8849" y="1118615"/>
+                  <a:pt x="34291" y="992555"/>
+                  <a:pt x="0" y="758669"/>
+                </a:cubicBezTo>
+                <a:cubicBezTo>
+                  <a:pt x="-34291" y="524783"/>
+                  <a:pt x="36871" y="373063"/>
+                  <a:pt x="0" y="0"/>
+                </a:cubicBezTo>
+                <a:close/>
+              </a:path>
+              <a:path w="10369127" h="2616101" stroke="0" extrusionOk="0">
+                <a:moveTo>
+                  <a:pt x="0" y="0"/>
+                </a:moveTo>
+                <a:cubicBezTo>
+                  <a:pt x="310397" y="-43944"/>
+                  <a:pt x="344281" y="80318"/>
+                  <a:pt x="679754" y="0"/>
+                </a:cubicBezTo>
+                <a:cubicBezTo>
+                  <a:pt x="1015227" y="-80318"/>
+                  <a:pt x="975875" y="44088"/>
+                  <a:pt x="1152125" y="0"/>
+                </a:cubicBezTo>
+                <a:cubicBezTo>
+                  <a:pt x="1328375" y="-44088"/>
+                  <a:pt x="1571800" y="64623"/>
+                  <a:pt x="1831879" y="0"/>
+                </a:cubicBezTo>
+                <a:cubicBezTo>
+                  <a:pt x="2091958" y="-64623"/>
+                  <a:pt x="2219250" y="26184"/>
+                  <a:pt x="2407942" y="0"/>
+                </a:cubicBezTo>
+                <a:cubicBezTo>
+                  <a:pt x="2596634" y="-26184"/>
+                  <a:pt x="2707773" y="64725"/>
+                  <a:pt x="2984004" y="0"/>
+                </a:cubicBezTo>
+                <a:cubicBezTo>
+                  <a:pt x="3260235" y="-64725"/>
+                  <a:pt x="3332765" y="26738"/>
+                  <a:pt x="3663758" y="0"/>
+                </a:cubicBezTo>
+                <a:cubicBezTo>
+                  <a:pt x="3994751" y="-26738"/>
+                  <a:pt x="4039334" y="14761"/>
+                  <a:pt x="4343512" y="0"/>
+                </a:cubicBezTo>
+                <a:cubicBezTo>
+                  <a:pt x="4647690" y="-14761"/>
+                  <a:pt x="4777125" y="76395"/>
+                  <a:pt x="5126957" y="0"/>
+                </a:cubicBezTo>
+                <a:cubicBezTo>
+                  <a:pt x="5476789" y="-76395"/>
+                  <a:pt x="5443778" y="3770"/>
+                  <a:pt x="5703020" y="0"/>
+                </a:cubicBezTo>
+                <a:cubicBezTo>
+                  <a:pt x="5962262" y="-3770"/>
+                  <a:pt x="5844982" y="22416"/>
+                  <a:pt x="5968009" y="0"/>
+                </a:cubicBezTo>
+                <a:cubicBezTo>
+                  <a:pt x="6091036" y="-22416"/>
+                  <a:pt x="6116821" y="27319"/>
+                  <a:pt x="6232997" y="0"/>
+                </a:cubicBezTo>
+                <a:cubicBezTo>
+                  <a:pt x="6349173" y="-27319"/>
+                  <a:pt x="6496944" y="45546"/>
+                  <a:pt x="6705369" y="0"/>
+                </a:cubicBezTo>
+                <a:cubicBezTo>
+                  <a:pt x="6913794" y="-45546"/>
+                  <a:pt x="6928082" y="30628"/>
+                  <a:pt x="7074049" y="0"/>
+                </a:cubicBezTo>
+                <a:cubicBezTo>
+                  <a:pt x="7220016" y="-30628"/>
+                  <a:pt x="7382121" y="5066"/>
+                  <a:pt x="7650111" y="0"/>
+                </a:cubicBezTo>
+                <a:cubicBezTo>
+                  <a:pt x="7918101" y="-5066"/>
+                  <a:pt x="7923275" y="38363"/>
+                  <a:pt x="8018792" y="0"/>
+                </a:cubicBezTo>
+                <a:cubicBezTo>
+                  <a:pt x="8114309" y="-38363"/>
+                  <a:pt x="8347537" y="29003"/>
+                  <a:pt x="8594854" y="0"/>
+                </a:cubicBezTo>
+                <a:cubicBezTo>
+                  <a:pt x="8842171" y="-29003"/>
+                  <a:pt x="8911339" y="24650"/>
+                  <a:pt x="9170917" y="0"/>
+                </a:cubicBezTo>
+                <a:cubicBezTo>
+                  <a:pt x="9430495" y="-24650"/>
+                  <a:pt x="9455499" y="39970"/>
+                  <a:pt x="9539597" y="0"/>
+                </a:cubicBezTo>
+                <a:cubicBezTo>
+                  <a:pt x="9623695" y="-39970"/>
+                  <a:pt x="10085184" y="66901"/>
+                  <a:pt x="10369127" y="0"/>
+                </a:cubicBezTo>
+                <a:cubicBezTo>
+                  <a:pt x="10392972" y="159673"/>
+                  <a:pt x="10305696" y="366148"/>
+                  <a:pt x="10369127" y="549381"/>
+                </a:cubicBezTo>
+                <a:cubicBezTo>
+                  <a:pt x="10432558" y="732614"/>
+                  <a:pt x="10342643" y="988760"/>
+                  <a:pt x="10369127" y="1124923"/>
+                </a:cubicBezTo>
+                <a:cubicBezTo>
+                  <a:pt x="10395611" y="1261086"/>
+                  <a:pt x="10341026" y="1543797"/>
+                  <a:pt x="10369127" y="1674305"/>
+                </a:cubicBezTo>
+                <a:cubicBezTo>
+                  <a:pt x="10397228" y="1804813"/>
+                  <a:pt x="10331822" y="2026220"/>
+                  <a:pt x="10369127" y="2145203"/>
+                </a:cubicBezTo>
+                <a:cubicBezTo>
+                  <a:pt x="10406432" y="2264186"/>
+                  <a:pt x="10327383" y="2490374"/>
+                  <a:pt x="10369127" y="2616101"/>
+                </a:cubicBezTo>
+                <a:cubicBezTo>
+                  <a:pt x="10109786" y="2656189"/>
+                  <a:pt x="9848591" y="2566822"/>
+                  <a:pt x="9585682" y="2616101"/>
+                </a:cubicBezTo>
+                <a:cubicBezTo>
+                  <a:pt x="9322774" y="2665380"/>
+                  <a:pt x="9368773" y="2605700"/>
+                  <a:pt x="9217002" y="2616101"/>
+                </a:cubicBezTo>
+                <a:cubicBezTo>
+                  <a:pt x="9065231" y="2626502"/>
+                  <a:pt x="8815721" y="2540076"/>
+                  <a:pt x="8537248" y="2616101"/>
+                </a:cubicBezTo>
+                <a:cubicBezTo>
+                  <a:pt x="8258775" y="2692126"/>
+                  <a:pt x="8269206" y="2579982"/>
+                  <a:pt x="8168568" y="2616101"/>
+                </a:cubicBezTo>
+                <a:cubicBezTo>
+                  <a:pt x="8067930" y="2652220"/>
+                  <a:pt x="7844631" y="2550338"/>
+                  <a:pt x="7592505" y="2616101"/>
+                </a:cubicBezTo>
+                <a:cubicBezTo>
+                  <a:pt x="7340379" y="2681864"/>
+                  <a:pt x="7443389" y="2588965"/>
+                  <a:pt x="7327516" y="2616101"/>
+                </a:cubicBezTo>
+                <a:cubicBezTo>
+                  <a:pt x="7211643" y="2643237"/>
+                  <a:pt x="6705732" y="2548623"/>
+                  <a:pt x="6544071" y="2616101"/>
+                </a:cubicBezTo>
+                <a:cubicBezTo>
+                  <a:pt x="6382411" y="2683579"/>
+                  <a:pt x="6047781" y="2603679"/>
+                  <a:pt x="5760626" y="2616101"/>
+                </a:cubicBezTo>
+                <a:cubicBezTo>
+                  <a:pt x="5473472" y="2628523"/>
+                  <a:pt x="5348330" y="2603452"/>
+                  <a:pt x="5184564" y="2616101"/>
+                </a:cubicBezTo>
+                <a:cubicBezTo>
+                  <a:pt x="5020798" y="2628750"/>
+                  <a:pt x="4942767" y="2564251"/>
+                  <a:pt x="4712192" y="2616101"/>
+                </a:cubicBezTo>
+                <a:cubicBezTo>
+                  <a:pt x="4481617" y="2667951"/>
+                  <a:pt x="4362634" y="2544528"/>
+                  <a:pt x="4032438" y="2616101"/>
+                </a:cubicBezTo>
+                <a:cubicBezTo>
+                  <a:pt x="3702242" y="2687674"/>
+                  <a:pt x="3569148" y="2567385"/>
+                  <a:pt x="3248993" y="2616101"/>
+                </a:cubicBezTo>
+                <a:cubicBezTo>
+                  <a:pt x="2928839" y="2664817"/>
+                  <a:pt x="2956540" y="2610508"/>
+                  <a:pt x="2672931" y="2616101"/>
+                </a:cubicBezTo>
+                <a:cubicBezTo>
+                  <a:pt x="2389322" y="2621694"/>
+                  <a:pt x="2342801" y="2589831"/>
+                  <a:pt x="2200559" y="2616101"/>
+                </a:cubicBezTo>
+                <a:cubicBezTo>
+                  <a:pt x="2058317" y="2642371"/>
+                  <a:pt x="1886748" y="2583899"/>
+                  <a:pt x="1624497" y="2616101"/>
+                </a:cubicBezTo>
+                <a:cubicBezTo>
+                  <a:pt x="1362246" y="2648303"/>
+                  <a:pt x="1093629" y="2547674"/>
+                  <a:pt x="841051" y="2616101"/>
+                </a:cubicBezTo>
+                <a:cubicBezTo>
+                  <a:pt x="588473" y="2684528"/>
+                  <a:pt x="645737" y="2604359"/>
+                  <a:pt x="576063" y="2616101"/>
+                </a:cubicBezTo>
+                <a:cubicBezTo>
+                  <a:pt x="506389" y="2627843"/>
+                  <a:pt x="176466" y="2570204"/>
+                  <a:pt x="0" y="2616101"/>
+                </a:cubicBezTo>
+                <a:cubicBezTo>
+                  <a:pt x="-11534" y="2489610"/>
+                  <a:pt x="6469" y="2343176"/>
+                  <a:pt x="0" y="2092881"/>
+                </a:cubicBezTo>
+                <a:cubicBezTo>
+                  <a:pt x="-6469" y="1842586"/>
+                  <a:pt x="12000" y="1728410"/>
+                  <a:pt x="0" y="1569661"/>
+                </a:cubicBezTo>
+                <a:cubicBezTo>
+                  <a:pt x="-12000" y="1410912"/>
+                  <a:pt x="17363" y="1334200"/>
+                  <a:pt x="0" y="1098762"/>
+                </a:cubicBezTo>
+                <a:cubicBezTo>
+                  <a:pt x="-17363" y="863324"/>
+                  <a:pt x="33872" y="679504"/>
+                  <a:pt x="0" y="549381"/>
+                </a:cubicBezTo>
+                <a:cubicBezTo>
+                  <a:pt x="-33872" y="419258"/>
+                  <a:pt x="8053" y="121503"/>
+                  <a:pt x="0" y="0"/>
+                </a:cubicBezTo>
+                <a:close/>
+              </a:path>
+            </a:pathLst>
+          </a:custGeom>
+          <a:solidFill>
+            <a:srgbClr val="EAEAEA"/>
+          </a:solidFill>
+          <a:ln>
+            <a:solidFill>
+              <a:schemeClr val="tx1"/>
+            </a:solidFill>
+            <a:extLst>
+              <a:ext uri="{C807C97D-BFC1-408E-A445-0C87EB9F89A2}">
+                <ask:lineSketchStyleProps xmlns:ask="http://schemas.microsoft.com/office/drawing/2018/sketchyshapes" sd="3100335024">
+                  <a:prstGeom prst="rect">
+                    <a:avLst/>
+                  </a:prstGeom>
+                  <ask:type>
+                    <ask:lineSketchScribble/>
+                  </ask:type>
+                </ask:lineSketchStyleProps>
+              </a:ext>
+            </a:extLst>
+          </a:ln>
+        </p:spPr>
+        <p:txBody>
+          <a:bodyPr wrap="square" rtlCol="0">
+            <a:spAutoFit/>
+          </a:bodyPr>
+          <a:lstStyle/>
+          <a:p>
+            <a:pPr algn="ctr"/>
+            <a:r>
+              <a:rPr lang="en-US" sz="4400" b="1" dirty="0"/>
+              <a:t>Acknowledgements</a:t>
+            </a:r>
+          </a:p>
+          <a:p>
+            <a:pPr algn="ctr"/>
+            <a:r>
+              <a:rPr lang="en-US" sz="4000" dirty="0"/>
+              <a:t>A big thank to </a:t>
+            </a:r>
+            <a:r>
+              <a:rPr lang="en-US" sz="4000" b="1" dirty="0" err="1">
+                <a:hlinkClick r:id="rId2"/>
+              </a:rPr>
+              <a:t>Zihuan</a:t>
+            </a:r>
+            <a:r>
+              <a:rPr lang="en-US" sz="4000" b="1" dirty="0">
+                <a:hlinkClick r:id="rId2"/>
+              </a:rPr>
+              <a:t> Cao </a:t>
+            </a:r>
+            <a:r>
+              <a:rPr lang="en-US" sz="4000" dirty="0"/>
+              <a:t>and </a:t>
+            </a:r>
+            <a:r>
+              <a:rPr lang="en-US" sz="4000" b="1" dirty="0">
+                <a:hlinkClick r:id="rId3"/>
+              </a:rPr>
+              <a:t>Jay Plourde</a:t>
+            </a:r>
+            <a:r>
+              <a:rPr lang="en-US" sz="4000" dirty="0">
+                <a:hlinkClick r:id="rId3"/>
+              </a:rPr>
+              <a:t> </a:t>
+            </a:r>
+            <a:r>
+              <a:rPr lang="en-US" sz="4000" dirty="0"/>
+              <a:t>for providing much of the code used in these slides🤗</a:t>
+            </a:r>
+          </a:p>
+        </p:txBody>
+      </p:sp>
     </p:spTree>
     <p:extLst>
       <p:ext uri="{BB962C8B-B14F-4D97-AF65-F5344CB8AC3E}">

</xml_diff>